<commit_message>
Điều chỉnh bài tập bài 21-25
</commit_message>
<xml_diff>
--- a/Bai 21 Phat hien trung lap gan.pptx
+++ b/Bai 21 Phat hien trung lap gan.pptx
@@ -26,11 +26,11 @@
     <p:sldId id="584" r:id="rId17"/>
     <p:sldId id="585" r:id="rId18"/>
     <p:sldId id="586" r:id="rId19"/>
-    <p:sldId id="587" r:id="rId20"/>
-    <p:sldId id="588" r:id="rId21"/>
-    <p:sldId id="589" r:id="rId22"/>
-    <p:sldId id="590" r:id="rId23"/>
-    <p:sldId id="591" r:id="rId24"/>
+    <p:sldId id="590" r:id="rId20"/>
+    <p:sldId id="591" r:id="rId21"/>
+    <p:sldId id="587" r:id="rId22"/>
+    <p:sldId id="588" r:id="rId23"/>
+    <p:sldId id="644" r:id="rId24"/>
     <p:sldId id="638" r:id="rId25"/>
   </p:sldIdLst>
   <p:sldSz cx="9144000" cy="6858000" type="screen4x3"/>
@@ -162,7 +162,7 @@
   </p:defaultTextStyle>
   <p:extLst>
     <p:ext uri="{EFAFB233-063F-42B5-8137-9DF3F51BA10A}">
-      <p15:sldGuideLst xmlns:p15="http://schemas.microsoft.com/office/powerpoint/2012/main" xmlns="">
+      <p15:sldGuideLst xmlns="" xmlns:p15="http://schemas.microsoft.com/office/powerpoint/2012/main">
         <p15:guide id="1" orient="horz" pos="2160">
           <p15:clr>
             <a:srgbClr val="A4A3A4"/>
@@ -176,7 +176,7 @@
       </p15:sldGuideLst>
     </p:ext>
     <p:ext uri="{2D200454-40CA-4A62-9FC3-DE9A4176ACB9}">
-      <p15:notesGuideLst xmlns:p15="http://schemas.microsoft.com/office/powerpoint/2012/main" xmlns="">
+      <p15:notesGuideLst xmlns="" xmlns:p15="http://schemas.microsoft.com/office/powerpoint/2012/main">
         <p15:guide id="1" orient="horz" pos="2880">
           <p15:clr>
             <a:srgbClr val="A4A3A4"/>
@@ -10257,1546 +10257,6 @@
       </p:grpSpPr>
       <p:sp>
         <p:nvSpPr>
-          <p:cNvPr id="7" name="Slide Number Placeholder 4"/>
-          <p:cNvSpPr>
-            <a:spLocks noGrp="1"/>
-          </p:cNvSpPr>
-          <p:nvPr>
-            <p:ph type="sldNum" sz="quarter" idx="12"/>
-          </p:nvPr>
-        </p:nvSpPr>
-        <p:spPr/>
-        <p:txBody>
-          <a:bodyPr/>
-          <a:lstStyle/>
-          <a:p>
-            <a:fld id="{C61735BE-39B3-4277-B803-DCC972D3AF44}" type="slidenum">
-              <a:rPr lang="vi-VN"/>
-              <a:pPr/>
-              <a:t>19</a:t>
-            </a:fld>
-            <a:endParaRPr lang="vi-VN"/>
-          </a:p>
-        </p:txBody>
-      </p:sp>
-      <p:sp>
-        <p:nvSpPr>
-          <p:cNvPr id="749570" name="Rectangle 2"/>
-          <p:cNvSpPr>
-            <a:spLocks noGrp="1" noChangeArrowheads="1"/>
-          </p:cNvSpPr>
-          <p:nvPr>
-            <p:ph type="title"/>
-          </p:nvPr>
-        </p:nvSpPr>
-        <p:spPr>
-          <a:noFill/>
-          <a:ln/>
-          <a:extLst>
-            <a:ext uri="{91240B29-F687-4F45-9708-019B960494DF}">
-              <a14:hiddenLine xmlns:a14="http://schemas.microsoft.com/office/drawing/2010/main" w="9525" cap="flat" cmpd="sng" algn="ctr">
-                <a:solidFill>
-                  <a:schemeClr val="tx1"/>
-                </a:solidFill>
-                <a:prstDash val="solid"/>
-                <a:miter lim="800000"/>
-                <a:headEnd/>
-                <a:tailEnd/>
-              </a14:hiddenLine>
-            </a:ext>
-          </a:extLst>
-        </p:spPr>
-        <p:txBody>
-          <a:bodyPr/>
-          <a:lstStyle/>
-          <a:p>
-            <a:r>
-              <a:rPr lang="de-DE"/>
-              <a:t> Bài tập</a:t>
-            </a:r>
-            <a:endParaRPr lang="vi-VN"/>
-          </a:p>
-        </p:txBody>
-      </p:sp>
-      <p:pic>
-        <p:nvPicPr>
-          <p:cNvPr id="749572" name="Picture 6" descr="1947.png"/>
-          <p:cNvPicPr>
-            <a:picLocks noChangeAspect="1"/>
-          </p:cNvPicPr>
-          <p:nvPr/>
-        </p:nvPicPr>
-        <p:blipFill>
-          <a:blip r:embed="rId2">
-            <a:extLst>
-              <a:ext uri="{28A0092B-C50C-407E-A947-70E740481C1C}">
-                <a14:useLocalDpi xmlns:a14="http://schemas.microsoft.com/office/drawing/2010/main" val="0"/>
-              </a:ext>
-            </a:extLst>
-          </a:blip>
-          <a:srcRect/>
-          <a:stretch>
-            <a:fillRect/>
-          </a:stretch>
-        </p:blipFill>
-        <p:spPr bwMode="auto">
-          <a:xfrm>
-            <a:off x="1619672" y="2636912"/>
-            <a:ext cx="2070100" cy="1785938"/>
-          </a:xfrm>
-          <a:prstGeom prst="rect">
-            <a:avLst/>
-          </a:prstGeom>
-          <a:noFill/>
-          <a:ln>
-            <a:noFill/>
-          </a:ln>
-          <a:extLst>
-            <a:ext uri="{909E8E84-426E-40DD-AFC4-6F175D3DCCD1}">
-              <a14:hiddenFill xmlns:a14="http://schemas.microsoft.com/office/drawing/2010/main">
-                <a:solidFill>
-                  <a:srgbClr val="FFFFFF"/>
-                </a:solidFill>
-              </a14:hiddenFill>
-            </a:ext>
-            <a:ext uri="{91240B29-F687-4F45-9708-019B960494DF}">
-              <a14:hiddenLine xmlns:a14="http://schemas.microsoft.com/office/drawing/2010/main" w="9525">
-                <a:solidFill>
-                  <a:srgbClr val="000000"/>
-                </a:solidFill>
-                <a:miter lim="800000"/>
-                <a:headEnd/>
-                <a:tailEnd/>
-              </a14:hiddenLine>
-            </a:ext>
-          </a:extLst>
-        </p:spPr>
-      </p:pic>
-      <p:sp>
-        <p:nvSpPr>
-          <p:cNvPr id="2" name="TextBox 1"/>
-          <p:cNvSpPr txBox="1"/>
-          <p:nvPr/>
-        </p:nvSpPr>
-        <p:spPr>
-          <a:xfrm>
-            <a:off x="1150938" y="2132856"/>
-            <a:ext cx="5221262" cy="400110"/>
-          </a:xfrm>
-          <a:prstGeom prst="rect">
-            <a:avLst/>
-          </a:prstGeom>
-          <a:noFill/>
-        </p:spPr>
-        <p:txBody>
-          <a:bodyPr wrap="square" rtlCol="0">
-            <a:spAutoFit/>
-          </a:bodyPr>
-          <a:lstStyle/>
-          <a:p>
-            <a:r>
-              <a:rPr lang="en-US" sz="2000" dirty="0" smtClean="0"/>
-              <a:t>Cho </a:t>
-            </a:r>
-            <a:r>
-              <a:rPr lang="en-US" sz="2000" dirty="0" err="1" smtClean="0"/>
-              <a:t>mô</a:t>
-            </a:r>
-            <a:r>
-              <a:rPr lang="en-US" sz="2000" dirty="0" smtClean="0"/>
-              <a:t> </a:t>
-            </a:r>
-            <a:r>
-              <a:rPr lang="en-US" sz="2000" dirty="0" err="1" smtClean="0"/>
-              <a:t>hình</a:t>
-            </a:r>
-            <a:r>
-              <a:rPr lang="en-US" sz="2000" dirty="0" smtClean="0"/>
-              <a:t> </a:t>
-            </a:r>
-            <a:r>
-              <a:rPr lang="en-US" sz="2000" dirty="0" err="1" smtClean="0"/>
-              <a:t>tập</a:t>
-            </a:r>
-            <a:r>
-              <a:rPr lang="en-US" sz="2000" dirty="0" smtClean="0"/>
-              <a:t> shingle </a:t>
-            </a:r>
-            <a:r>
-              <a:rPr lang="en-US" sz="2000" dirty="0" err="1" smtClean="0"/>
-              <a:t>của</a:t>
-            </a:r>
-            <a:r>
-              <a:rPr lang="en-US" sz="2000" dirty="0" smtClean="0"/>
-              <a:t> </a:t>
-            </a:r>
-            <a:r>
-              <a:rPr lang="en-US" sz="2000" dirty="0" err="1" smtClean="0"/>
-              <a:t>văn</a:t>
-            </a:r>
-            <a:r>
-              <a:rPr lang="en-US" sz="2000" dirty="0" smtClean="0"/>
-              <a:t> </a:t>
-            </a:r>
-            <a:r>
-              <a:rPr lang="en-US" sz="2000" dirty="0" err="1" smtClean="0"/>
-              <a:t>bản</a:t>
-            </a:r>
-            <a:endParaRPr lang="vi-VN" sz="2000" dirty="0"/>
-          </a:p>
-        </p:txBody>
-      </p:sp>
-      <p:sp>
-        <p:nvSpPr>
-          <p:cNvPr id="8" name="TextBox 7"/>
-          <p:cNvSpPr txBox="1"/>
-          <p:nvPr/>
-        </p:nvSpPr>
-        <p:spPr>
-          <a:xfrm>
-            <a:off x="1150938" y="4869160"/>
-            <a:ext cx="6013350" cy="707886"/>
-          </a:xfrm>
-          <a:prstGeom prst="rect">
-            <a:avLst/>
-          </a:prstGeom>
-          <a:noFill/>
-        </p:spPr>
-        <p:txBody>
-          <a:bodyPr wrap="square" rtlCol="0">
-            <a:spAutoFit/>
-          </a:bodyPr>
-          <a:lstStyle/>
-          <a:p>
-            <a:r>
-              <a:rPr lang="en-US" sz="2000" dirty="0" err="1" smtClean="0"/>
-              <a:t>Hãy</a:t>
-            </a:r>
-            <a:r>
-              <a:rPr lang="en-US" sz="2000" dirty="0" smtClean="0"/>
-              <a:t> </a:t>
-            </a:r>
-            <a:r>
-              <a:rPr lang="en-US" sz="2000" dirty="0" err="1" smtClean="0"/>
-              <a:t>ước</a:t>
-            </a:r>
-            <a:r>
-              <a:rPr lang="en-US" sz="2000" dirty="0" smtClean="0"/>
-              <a:t> </a:t>
-            </a:r>
-            <a:r>
-              <a:rPr lang="en-US" sz="2000" dirty="0" err="1" smtClean="0"/>
-              <a:t>lượng</a:t>
-            </a:r>
-            <a:r>
-              <a:rPr lang="en-US" sz="2000" dirty="0" smtClean="0"/>
-              <a:t> </a:t>
-            </a:r>
-            <a:r>
-              <a:rPr lang="en-US" sz="2000" dirty="0" err="1" smtClean="0"/>
-              <a:t>hệ</a:t>
-            </a:r>
-            <a:r>
-              <a:rPr lang="en-US" sz="2000" dirty="0" smtClean="0"/>
-              <a:t> </a:t>
-            </a:r>
-            <a:r>
-              <a:rPr lang="en-US" sz="2000" dirty="0" err="1" smtClean="0"/>
-              <a:t>số</a:t>
-            </a:r>
-            <a:r>
-              <a:rPr lang="en-US" sz="2000" dirty="0" smtClean="0"/>
-              <a:t> </a:t>
-            </a:r>
-            <a:r>
-              <a:rPr lang="en-US" sz="2000" dirty="0" err="1" smtClean="0"/>
-              <a:t>Jaccard</a:t>
-            </a:r>
-            <a:r>
-              <a:rPr lang="en-US" sz="2000" dirty="0" smtClean="0"/>
-              <a:t>:</a:t>
-            </a:r>
-          </a:p>
-          <a:p>
-            <a:r>
-              <a:rPr lang="en-US" sz="2000" dirty="0" smtClean="0"/>
-              <a:t>	J(d</a:t>
-            </a:r>
-            <a:r>
-              <a:rPr lang="en-US" sz="2000" baseline="-25000" dirty="0" smtClean="0"/>
-              <a:t>1</a:t>
-            </a:r>
-            <a:r>
-              <a:rPr lang="en-US" sz="2000" dirty="0" smtClean="0"/>
-              <a:t>, d</a:t>
-            </a:r>
-            <a:r>
-              <a:rPr lang="en-US" sz="2000" baseline="-25000" dirty="0" smtClean="0"/>
-              <a:t>2</a:t>
-            </a:r>
-            <a:r>
-              <a:rPr lang="en-US" sz="2000" dirty="0" smtClean="0"/>
-              <a:t>), J(d</a:t>
-            </a:r>
-            <a:r>
-              <a:rPr lang="en-US" sz="2000" baseline="-25000" dirty="0" smtClean="0"/>
-              <a:t>1</a:t>
-            </a:r>
-            <a:r>
-              <a:rPr lang="en-US" sz="2000" dirty="0" smtClean="0"/>
-              <a:t>, d</a:t>
-            </a:r>
-            <a:r>
-              <a:rPr lang="en-US" sz="2000" baseline="-25000" dirty="0" smtClean="0"/>
-              <a:t>3</a:t>
-            </a:r>
-            <a:r>
-              <a:rPr lang="en-US" sz="2000" dirty="0" smtClean="0"/>
-              <a:t>), J(d</a:t>
-            </a:r>
-            <a:r>
-              <a:rPr lang="en-US" sz="2000" baseline="-25000" dirty="0" smtClean="0"/>
-              <a:t>2</a:t>
-            </a:r>
-            <a:r>
-              <a:rPr lang="en-US" sz="2000" dirty="0" smtClean="0"/>
-              <a:t>, d</a:t>
-            </a:r>
-            <a:r>
-              <a:rPr lang="en-US" sz="2000" baseline="-25000" dirty="0" smtClean="0"/>
-              <a:t>3</a:t>
-            </a:r>
-            <a:r>
-              <a:rPr lang="en-US" sz="2000" dirty="0" smtClean="0"/>
-              <a:t>)</a:t>
-            </a:r>
-            <a:endParaRPr lang="vi-VN" sz="2000" dirty="0"/>
-          </a:p>
-        </p:txBody>
-      </p:sp>
-      <p:sp>
-        <p:nvSpPr>
-          <p:cNvPr id="9" name="Rectangle 8"/>
-          <p:cNvSpPr/>
-          <p:nvPr/>
-        </p:nvSpPr>
-        <p:spPr>
-          <a:xfrm>
-            <a:off x="5617594" y="4807971"/>
-            <a:ext cx="3357562" cy="830263"/>
-          </a:xfrm>
-          <a:prstGeom prst="rect">
-            <a:avLst/>
-          </a:prstGeom>
-        </p:spPr>
-        <p:txBody>
-          <a:bodyPr>
-            <a:spAutoFit/>
-          </a:bodyPr>
-          <a:lstStyle/>
-          <a:p>
-            <a:r>
-              <a:rPr lang="de-DE" sz="2400" i="1" dirty="0">
-                <a:latin typeface="Calibri" panose="020F0502020204030204" pitchFamily="34" charset="0"/>
-                <a:ea typeface="ＭＳ Ｐゴシック" panose="020B0600070205080204" pitchFamily="34" charset="-128"/>
-              </a:rPr>
-              <a:t>h</a:t>
-            </a:r>
-            <a:r>
-              <a:rPr lang="de-DE" sz="2400" dirty="0">
-                <a:latin typeface="Calibri" panose="020F0502020204030204" pitchFamily="34" charset="0"/>
-                <a:ea typeface="ＭＳ Ｐゴシック" panose="020B0600070205080204" pitchFamily="34" charset="-128"/>
-              </a:rPr>
-              <a:t>(</a:t>
-            </a:r>
-            <a:r>
-              <a:rPr lang="de-DE" sz="2400" i="1" dirty="0">
-                <a:latin typeface="Calibri" panose="020F0502020204030204" pitchFamily="34" charset="0"/>
-                <a:ea typeface="ＭＳ Ｐゴシック" panose="020B0600070205080204" pitchFamily="34" charset="-128"/>
-              </a:rPr>
-              <a:t>x</a:t>
-            </a:r>
-            <a:r>
-              <a:rPr lang="de-DE" sz="2400" dirty="0">
-                <a:latin typeface="Calibri" panose="020F0502020204030204" pitchFamily="34" charset="0"/>
-                <a:ea typeface="ＭＳ Ｐゴシック" panose="020B0600070205080204" pitchFamily="34" charset="-128"/>
-              </a:rPr>
-              <a:t>) = </a:t>
-            </a:r>
-            <a:r>
-              <a:rPr lang="de-DE" sz="2400" dirty="0" smtClean="0">
-                <a:latin typeface="Calibri" panose="020F0502020204030204" pitchFamily="34" charset="0"/>
-                <a:ea typeface="ＭＳ Ｐゴシック" panose="020B0600070205080204" pitchFamily="34" charset="-128"/>
-              </a:rPr>
-              <a:t>(5</a:t>
-            </a:r>
-            <a:r>
-              <a:rPr lang="de-DE" sz="2400" i="1" dirty="0" smtClean="0">
-                <a:latin typeface="Calibri" panose="020F0502020204030204" pitchFamily="34" charset="0"/>
-                <a:ea typeface="ＭＳ Ｐゴシック" panose="020B0600070205080204" pitchFamily="34" charset="-128"/>
-              </a:rPr>
-              <a:t>x</a:t>
-            </a:r>
-            <a:r>
-              <a:rPr lang="de-DE" sz="2400" dirty="0" smtClean="0">
-                <a:latin typeface="Calibri" panose="020F0502020204030204" pitchFamily="34" charset="0"/>
-                <a:ea typeface="ＭＳ Ｐゴシック" panose="020B0600070205080204" pitchFamily="34" charset="-128"/>
-              </a:rPr>
-              <a:t> </a:t>
-            </a:r>
-            <a:r>
-              <a:rPr lang="de-DE" sz="2400" dirty="0">
-                <a:latin typeface="Calibri" panose="020F0502020204030204" pitchFamily="34" charset="0"/>
-                <a:ea typeface="ＭＳ Ｐゴシック" panose="020B0600070205080204" pitchFamily="34" charset="-128"/>
-              </a:rPr>
-              <a:t>+ </a:t>
-            </a:r>
-            <a:r>
-              <a:rPr lang="de-DE" sz="2400" dirty="0" smtClean="0">
-                <a:latin typeface="Calibri" panose="020F0502020204030204" pitchFamily="34" charset="0"/>
-                <a:ea typeface="ＭＳ Ｐゴシック" panose="020B0600070205080204" pitchFamily="34" charset="-128"/>
-              </a:rPr>
-              <a:t>5) </a:t>
-            </a:r>
-            <a:r>
-              <a:rPr lang="de-DE" sz="2400" dirty="0">
-                <a:latin typeface="Calibri" panose="020F0502020204030204" pitchFamily="34" charset="0"/>
-                <a:ea typeface="ＭＳ Ｐゴシック" panose="020B0600070205080204" pitchFamily="34" charset="-128"/>
-              </a:rPr>
-              <a:t>mod 4</a:t>
-            </a:r>
-          </a:p>
-          <a:p>
-            <a:r>
-              <a:rPr lang="da-DK" sz="2400" i="1" dirty="0">
-                <a:latin typeface="Calibri" panose="020F0502020204030204" pitchFamily="34" charset="0"/>
-                <a:ea typeface="ＭＳ Ｐゴシック" panose="020B0600070205080204" pitchFamily="34" charset="-128"/>
-              </a:rPr>
-              <a:t>g</a:t>
-            </a:r>
-            <a:r>
-              <a:rPr lang="da-DK" sz="2400" dirty="0">
-                <a:latin typeface="Calibri" panose="020F0502020204030204" pitchFamily="34" charset="0"/>
-                <a:ea typeface="ＭＳ Ｐゴシック" panose="020B0600070205080204" pitchFamily="34" charset="-128"/>
-              </a:rPr>
-              <a:t>(x) = (3</a:t>
-            </a:r>
-            <a:r>
-              <a:rPr lang="da-DK" sz="2400" i="1" dirty="0">
-                <a:latin typeface="Calibri" panose="020F0502020204030204" pitchFamily="34" charset="0"/>
-                <a:ea typeface="ＭＳ Ｐゴシック" panose="020B0600070205080204" pitchFamily="34" charset="-128"/>
-              </a:rPr>
-              <a:t>x</a:t>
-            </a:r>
-            <a:r>
-              <a:rPr lang="da-DK" sz="2400" dirty="0">
-                <a:latin typeface="Calibri" panose="020F0502020204030204" pitchFamily="34" charset="0"/>
-                <a:ea typeface="ＭＳ Ｐゴシック" panose="020B0600070205080204" pitchFamily="34" charset="-128"/>
-              </a:rPr>
-              <a:t> + 1) mod 4</a:t>
-            </a:r>
-          </a:p>
-        </p:txBody>
-      </p:sp>
-    </p:spTree>
-  </p:cSld>
-  <p:clrMapOvr>
-    <a:masterClrMapping/>
-  </p:clrMapOvr>
-  <p:timing>
-    <p:tnLst>
-      <p:par>
-        <p:cTn id="1" dur="indefinite" restart="never" nodeType="tmRoot"/>
-      </p:par>
-    </p:tnLst>
-  </p:timing>
-</p:sld>
-</file>
-
-<file path=ppt/slides/slide2.xml><?xml version="1.0" encoding="utf-8"?>
-<p:sld xmlns:a="http://schemas.openxmlformats.org/drawingml/2006/main" xmlns:r="http://schemas.openxmlformats.org/officeDocument/2006/relationships" xmlns:p="http://schemas.openxmlformats.org/presentationml/2006/main">
-  <p:cSld>
-    <p:spTree>
-      <p:nvGrpSpPr>
-        <p:cNvPr id="1" name=""/>
-        <p:cNvGrpSpPr/>
-        <p:nvPr/>
-      </p:nvGrpSpPr>
-      <p:grpSpPr>
-        <a:xfrm>
-          <a:off x="0" y="0"/>
-          <a:ext cx="0" cy="0"/>
-          <a:chOff x="0" y="0"/>
-          <a:chExt cx="0" cy="0"/>
-        </a:xfrm>
-      </p:grpSpPr>
-      <p:sp>
-        <p:nvSpPr>
-          <p:cNvPr id="6146" name="Rectangle 2"/>
-          <p:cNvSpPr>
-            <a:spLocks noGrp="1" noChangeArrowheads="1"/>
-          </p:cNvSpPr>
-          <p:nvPr>
-            <p:ph type="title"/>
-          </p:nvPr>
-        </p:nvSpPr>
-        <p:spPr/>
-        <p:txBody>
-          <a:bodyPr/>
-          <a:lstStyle/>
-          <a:p>
-            <a:pPr eaLnBrk="1" hangingPunct="1"/>
-            <a:r>
-              <a:rPr lang="vi-VN" sz="3600" dirty="0" smtClean="0"/>
-              <a:t>Nội dung chính</a:t>
-            </a:r>
-          </a:p>
-        </p:txBody>
-      </p:sp>
-      <p:sp>
-        <p:nvSpPr>
-          <p:cNvPr id="6147" name="Rectangle 3"/>
-          <p:cNvSpPr>
-            <a:spLocks noGrp="1" noChangeArrowheads="1"/>
-          </p:cNvSpPr>
-          <p:nvPr>
-            <p:ph type="body" idx="1"/>
-          </p:nvPr>
-        </p:nvSpPr>
-        <p:spPr>
-          <a:xfrm>
-            <a:off x="611560" y="2017713"/>
-            <a:ext cx="8343528" cy="4114800"/>
-          </a:xfrm>
-        </p:spPr>
-        <p:txBody>
-          <a:bodyPr/>
-          <a:lstStyle/>
-          <a:p>
-            <a:pPr algn="just" eaLnBrk="1" hangingPunct="1">
-              <a:defRPr/>
-            </a:pPr>
-            <a:r>
-              <a:rPr lang="vi-VN" smtClean="0"/>
-              <a:t>Phát hiện trùng lặp gần</a:t>
-            </a:r>
-            <a:endParaRPr lang="vi-VN" sz="2800" dirty="0" smtClean="0"/>
-          </a:p>
-          <a:p>
-            <a:pPr algn="just" eaLnBrk="1" hangingPunct="1">
-              <a:defRPr/>
-            </a:pPr>
-            <a:r>
-              <a:rPr lang="vi-VN" smtClean="0">
-                <a:solidFill>
-                  <a:schemeClr val="bg1">
-                    <a:lumMod val="65000"/>
-                  </a:schemeClr>
-                </a:solidFill>
-              </a:rPr>
-              <a:t>Tính độ tương đồng bằng hệ số Jaccard</a:t>
-            </a:r>
-          </a:p>
-          <a:p>
-            <a:pPr algn="just" eaLnBrk="1" hangingPunct="1">
-              <a:defRPr/>
-            </a:pPr>
-            <a:r>
-              <a:rPr lang="vi-VN" smtClean="0">
-                <a:solidFill>
-                  <a:schemeClr val="bg1">
-                    <a:lumMod val="65000"/>
-                  </a:schemeClr>
-                </a:solidFill>
-              </a:rPr>
-              <a:t>Ước lượng hệ số Jaccard sử dụng phép trộn</a:t>
-            </a:r>
-            <a:endParaRPr lang="vi-VN" sz="2800" dirty="0" smtClean="0">
-              <a:solidFill>
-                <a:schemeClr val="bg1">
-                  <a:lumMod val="65000"/>
-                </a:schemeClr>
-              </a:solidFill>
-            </a:endParaRPr>
-          </a:p>
-        </p:txBody>
-      </p:sp>
-      <p:sp>
-        <p:nvSpPr>
-          <p:cNvPr id="2" name="Slide Number Placeholder 1"/>
-          <p:cNvSpPr>
-            <a:spLocks noGrp="1"/>
-          </p:cNvSpPr>
-          <p:nvPr>
-            <p:ph type="sldNum" sz="quarter" idx="12"/>
-          </p:nvPr>
-        </p:nvSpPr>
-        <p:spPr/>
-        <p:txBody>
-          <a:bodyPr/>
-          <a:lstStyle/>
-          <a:p>
-            <a:pPr>
-              <a:defRPr/>
-            </a:pPr>
-            <a:fld id="{A81E07A1-38DA-436E-9EB2-1E501CB9FFA7}" type="slidenum">
-              <a:rPr lang="vi-VN" smtClean="0"/>
-              <a:pPr>
-                <a:defRPr/>
-              </a:pPr>
-              <a:t>2</a:t>
-            </a:fld>
-            <a:endParaRPr lang="vi-VN"/>
-          </a:p>
-        </p:txBody>
-      </p:sp>
-    </p:spTree>
-    <p:extLst>
-      <p:ext uri="{BB962C8B-B14F-4D97-AF65-F5344CB8AC3E}">
-        <p14:creationId xmlns:p14="http://schemas.microsoft.com/office/powerpoint/2010/main" val="2915804248"/>
-      </p:ext>
-    </p:extLst>
-  </p:cSld>
-  <p:clrMapOvr>
-    <a:masterClrMapping/>
-  </p:clrMapOvr>
-  <p:timing>
-    <p:tnLst>
-      <p:par>
-        <p:cTn id="1" dur="indefinite" restart="never" nodeType="tmRoot"/>
-      </p:par>
-    </p:tnLst>
-  </p:timing>
-</p:sld>
-</file>
-
-<file path=ppt/slides/slide20.xml><?xml version="1.0" encoding="utf-8"?>
-<p:sld xmlns:a="http://schemas.openxmlformats.org/drawingml/2006/main" xmlns:r="http://schemas.openxmlformats.org/officeDocument/2006/relationships" xmlns:p="http://schemas.openxmlformats.org/presentationml/2006/main">
-  <p:cSld>
-    <p:spTree>
-      <p:nvGrpSpPr>
-        <p:cNvPr id="1" name=""/>
-        <p:cNvGrpSpPr/>
-        <p:nvPr/>
-      </p:nvGrpSpPr>
-      <p:grpSpPr>
-        <a:xfrm>
-          <a:off x="0" y="0"/>
-          <a:ext cx="0" cy="0"/>
-          <a:chOff x="0" y="0"/>
-          <a:chExt cx="0" cy="0"/>
-        </a:xfrm>
-      </p:grpSpPr>
-      <p:sp>
-        <p:nvSpPr>
-          <p:cNvPr id="8" name="Slide Number Placeholder 4"/>
-          <p:cNvSpPr>
-            <a:spLocks noGrp="1"/>
-          </p:cNvSpPr>
-          <p:nvPr>
-            <p:ph type="sldNum" sz="quarter" idx="12"/>
-          </p:nvPr>
-        </p:nvSpPr>
-        <p:spPr/>
-        <p:txBody>
-          <a:bodyPr/>
-          <a:lstStyle/>
-          <a:p>
-            <a:fld id="{31EFD422-4EEE-417C-AA0D-1AE916CDBF3E}" type="slidenum">
-              <a:rPr lang="vi-VN"/>
-              <a:pPr/>
-              <a:t>20</a:t>
-            </a:fld>
-            <a:endParaRPr lang="vi-VN"/>
-          </a:p>
-        </p:txBody>
-      </p:sp>
-      <p:sp>
-        <p:nvSpPr>
-          <p:cNvPr id="751618" name="Rectangle 2"/>
-          <p:cNvSpPr>
-            <a:spLocks noGrp="1" noChangeArrowheads="1"/>
-          </p:cNvSpPr>
-          <p:nvPr>
-            <p:ph type="title"/>
-          </p:nvPr>
-        </p:nvSpPr>
-        <p:spPr>
-          <a:noFill/>
-          <a:ln/>
-          <a:extLst>
-            <a:ext uri="{91240B29-F687-4F45-9708-019B960494DF}">
-              <a14:hiddenLine xmlns:a14="http://schemas.microsoft.com/office/drawing/2010/main" w="9525" cap="flat" cmpd="sng" algn="ctr">
-                <a:solidFill>
-                  <a:schemeClr val="tx1"/>
-                </a:solidFill>
-                <a:prstDash val="solid"/>
-                <a:miter lim="800000"/>
-                <a:headEnd/>
-                <a:tailEnd/>
-              </a14:hiddenLine>
-            </a:ext>
-          </a:extLst>
-        </p:spPr>
-        <p:txBody>
-          <a:bodyPr/>
-          <a:lstStyle/>
-          <a:p>
-            <a:r>
-              <a:rPr lang="de-DE" dirty="0" smtClean="0"/>
-              <a:t>Đáp án</a:t>
-            </a:r>
-            <a:endParaRPr lang="vi-VN" dirty="0"/>
-          </a:p>
-        </p:txBody>
-      </p:sp>
-      <p:sp>
-        <p:nvSpPr>
-          <p:cNvPr id="84996" name="Text Box 3"/>
-          <p:cNvSpPr txBox="1">
-            <a:spLocks noChangeArrowheads="1"/>
-          </p:cNvSpPr>
-          <p:nvPr/>
-        </p:nvSpPr>
-        <p:spPr bwMode="auto">
-          <a:xfrm>
-            <a:off x="5364088" y="5943600"/>
-            <a:ext cx="2814637" cy="600075"/>
-          </a:xfrm>
-          <a:prstGeom prst="rect">
-            <a:avLst/>
-          </a:prstGeom>
-          <a:noFill/>
-          <a:ln w="9525">
-            <a:noFill/>
-            <a:round/>
-            <a:headEnd/>
-            <a:tailEnd/>
-          </a:ln>
-        </p:spPr>
-        <p:txBody>
-          <a:bodyPr/>
-          <a:lstStyle/>
-          <a:p>
-            <a:r>
-              <a:rPr lang="de-DE" sz="2400" dirty="0" smtClean="0">
-                <a:latin typeface="Calibri" panose="020F0502020204030204" pitchFamily="34" charset="0"/>
-                <a:ea typeface="ＭＳ Ｐゴシック" panose="020B0600070205080204" pitchFamily="34" charset="-128"/>
-              </a:rPr>
-              <a:t>Các biểu diễn khung</a:t>
-            </a:r>
-            <a:endParaRPr lang="de-DE" sz="2400" dirty="0">
-              <a:latin typeface="Calibri" panose="020F0502020204030204" pitchFamily="34" charset="0"/>
-              <a:ea typeface="ＭＳ Ｐゴシック" panose="020B0600070205080204" pitchFamily="34" charset="-128"/>
-            </a:endParaRPr>
-          </a:p>
-        </p:txBody>
-      </p:sp>
-      <p:pic>
-        <p:nvPicPr>
-          <p:cNvPr id="751621" name="Picture 8" descr="1948.png"/>
-          <p:cNvPicPr>
-            <a:picLocks noChangeAspect="1"/>
-          </p:cNvPicPr>
-          <p:nvPr/>
-        </p:nvPicPr>
-        <p:blipFill>
-          <a:blip r:embed="rId2">
-            <a:extLst>
-              <a:ext uri="{28A0092B-C50C-407E-A947-70E740481C1C}">
-                <a14:useLocalDpi xmlns:a14="http://schemas.microsoft.com/office/drawing/2010/main" val="0"/>
-              </a:ext>
-            </a:extLst>
-          </a:blip>
-          <a:srcRect/>
-          <a:stretch>
-            <a:fillRect/>
-          </a:stretch>
-        </p:blipFill>
-        <p:spPr bwMode="auto">
-          <a:xfrm>
-            <a:off x="500063" y="2071688"/>
-            <a:ext cx="2286000" cy="1924050"/>
-          </a:xfrm>
-          <a:prstGeom prst="rect">
-            <a:avLst/>
-          </a:prstGeom>
-          <a:noFill/>
-          <a:ln>
-            <a:noFill/>
-          </a:ln>
-          <a:extLst>
-            <a:ext uri="{909E8E84-426E-40DD-AFC4-6F175D3DCCD1}">
-              <a14:hiddenFill xmlns:a14="http://schemas.microsoft.com/office/drawing/2010/main">
-                <a:solidFill>
-                  <a:srgbClr val="FFFFFF"/>
-                </a:solidFill>
-              </a14:hiddenFill>
-            </a:ext>
-            <a:ext uri="{91240B29-F687-4F45-9708-019B960494DF}">
-              <a14:hiddenLine xmlns:a14="http://schemas.microsoft.com/office/drawing/2010/main" w="9525">
-                <a:solidFill>
-                  <a:srgbClr val="000000"/>
-                </a:solidFill>
-                <a:miter lim="800000"/>
-                <a:headEnd/>
-                <a:tailEnd/>
-              </a14:hiddenLine>
-            </a:ext>
-          </a:extLst>
-        </p:spPr>
-      </p:pic>
-      <p:pic>
-        <p:nvPicPr>
-          <p:cNvPr id="751622" name="Picture 9" descr="19482.png"/>
-          <p:cNvPicPr>
-            <a:picLocks noChangeAspect="1"/>
-          </p:cNvPicPr>
-          <p:nvPr/>
-        </p:nvPicPr>
-        <p:blipFill>
-          <a:blip r:embed="rId3">
-            <a:extLst>
-              <a:ext uri="{28A0092B-C50C-407E-A947-70E740481C1C}">
-                <a14:useLocalDpi xmlns:a14="http://schemas.microsoft.com/office/drawing/2010/main" val="0"/>
-              </a:ext>
-            </a:extLst>
-          </a:blip>
-          <a:srcRect/>
-          <a:stretch>
-            <a:fillRect/>
-          </a:stretch>
-        </p:blipFill>
-        <p:spPr bwMode="auto">
-          <a:xfrm>
-            <a:off x="4143375" y="1500188"/>
-            <a:ext cx="4746625" cy="4071937"/>
-          </a:xfrm>
-          <a:prstGeom prst="rect">
-            <a:avLst/>
-          </a:prstGeom>
-          <a:noFill/>
-          <a:ln>
-            <a:noFill/>
-          </a:ln>
-          <a:extLst>
-            <a:ext uri="{909E8E84-426E-40DD-AFC4-6F175D3DCCD1}">
-              <a14:hiddenFill xmlns:a14="http://schemas.microsoft.com/office/drawing/2010/main">
-                <a:solidFill>
-                  <a:srgbClr val="FFFFFF"/>
-                </a:solidFill>
-              </a14:hiddenFill>
-            </a:ext>
-            <a:ext uri="{91240B29-F687-4F45-9708-019B960494DF}">
-              <a14:hiddenLine xmlns:a14="http://schemas.microsoft.com/office/drawing/2010/main" w="9525">
-                <a:solidFill>
-                  <a:srgbClr val="000000"/>
-                </a:solidFill>
-                <a:miter lim="800000"/>
-                <a:headEnd/>
-                <a:tailEnd/>
-              </a14:hiddenLine>
-            </a:ext>
-          </a:extLst>
-        </p:spPr>
-      </p:pic>
-      <p:sp>
-        <p:nvSpPr>
-          <p:cNvPr id="11" name="Rectangle 10"/>
-          <p:cNvSpPr/>
-          <p:nvPr/>
-        </p:nvSpPr>
-        <p:spPr>
-          <a:xfrm>
-            <a:off x="500063" y="4714875"/>
-            <a:ext cx="3357562" cy="830263"/>
-          </a:xfrm>
-          <a:prstGeom prst="rect">
-            <a:avLst/>
-          </a:prstGeom>
-        </p:spPr>
-        <p:txBody>
-          <a:bodyPr>
-            <a:spAutoFit/>
-          </a:bodyPr>
-          <a:lstStyle/>
-          <a:p>
-            <a:r>
-              <a:rPr lang="de-DE" sz="2400" i="1" dirty="0">
-                <a:latin typeface="Calibri" panose="020F0502020204030204" pitchFamily="34" charset="0"/>
-                <a:ea typeface="ＭＳ Ｐゴシック" panose="020B0600070205080204" pitchFamily="34" charset="-128"/>
-              </a:rPr>
-              <a:t>h</a:t>
-            </a:r>
-            <a:r>
-              <a:rPr lang="de-DE" sz="2400" dirty="0">
-                <a:latin typeface="Calibri" panose="020F0502020204030204" pitchFamily="34" charset="0"/>
-                <a:ea typeface="ＭＳ Ｐゴシック" panose="020B0600070205080204" pitchFamily="34" charset="-128"/>
-              </a:rPr>
-              <a:t>(</a:t>
-            </a:r>
-            <a:r>
-              <a:rPr lang="de-DE" sz="2400" i="1" dirty="0">
-                <a:latin typeface="Calibri" panose="020F0502020204030204" pitchFamily="34" charset="0"/>
-                <a:ea typeface="ＭＳ Ｐゴシック" panose="020B0600070205080204" pitchFamily="34" charset="-128"/>
-              </a:rPr>
-              <a:t>x</a:t>
-            </a:r>
-            <a:r>
-              <a:rPr lang="de-DE" sz="2400" dirty="0">
-                <a:latin typeface="Calibri" panose="020F0502020204030204" pitchFamily="34" charset="0"/>
-                <a:ea typeface="ＭＳ Ｐゴシック" panose="020B0600070205080204" pitchFamily="34" charset="-128"/>
-              </a:rPr>
-              <a:t>) </a:t>
-            </a:r>
-            <a:r>
-              <a:rPr lang="de-DE" sz="2400">
-                <a:latin typeface="Calibri" panose="020F0502020204030204" pitchFamily="34" charset="0"/>
-                <a:ea typeface="ＭＳ Ｐゴシック" panose="020B0600070205080204" pitchFamily="34" charset="-128"/>
-              </a:rPr>
-              <a:t>= </a:t>
-            </a:r>
-            <a:r>
-              <a:rPr lang="de-DE" sz="2400" smtClean="0">
-                <a:latin typeface="Calibri" panose="020F0502020204030204" pitchFamily="34" charset="0"/>
-                <a:ea typeface="ＭＳ Ｐゴシック" panose="020B0600070205080204" pitchFamily="34" charset="-128"/>
-              </a:rPr>
-              <a:t>(5</a:t>
-            </a:r>
-            <a:r>
-              <a:rPr lang="de-DE" sz="2400" i="1" smtClean="0">
-                <a:latin typeface="Calibri" panose="020F0502020204030204" pitchFamily="34" charset="0"/>
-                <a:ea typeface="ＭＳ Ｐゴシック" panose="020B0600070205080204" pitchFamily="34" charset="-128"/>
-              </a:rPr>
-              <a:t>x</a:t>
-            </a:r>
-            <a:r>
-              <a:rPr lang="de-DE" sz="2400" smtClean="0">
-                <a:latin typeface="Calibri" panose="020F0502020204030204" pitchFamily="34" charset="0"/>
-                <a:ea typeface="ＭＳ Ｐゴシック" panose="020B0600070205080204" pitchFamily="34" charset="-128"/>
-              </a:rPr>
-              <a:t> </a:t>
-            </a:r>
-            <a:r>
-              <a:rPr lang="de-DE" sz="2400">
-                <a:latin typeface="Calibri" panose="020F0502020204030204" pitchFamily="34" charset="0"/>
-                <a:ea typeface="ＭＳ Ｐゴシック" panose="020B0600070205080204" pitchFamily="34" charset="-128"/>
-              </a:rPr>
-              <a:t>+ </a:t>
-            </a:r>
-            <a:r>
-              <a:rPr lang="de-DE" sz="2400" smtClean="0">
-                <a:latin typeface="Calibri" panose="020F0502020204030204" pitchFamily="34" charset="0"/>
-                <a:ea typeface="ＭＳ Ｐゴシック" panose="020B0600070205080204" pitchFamily="34" charset="-128"/>
-              </a:rPr>
-              <a:t>5) </a:t>
-            </a:r>
-            <a:r>
-              <a:rPr lang="de-DE" sz="2400" dirty="0">
-                <a:latin typeface="Calibri" panose="020F0502020204030204" pitchFamily="34" charset="0"/>
-                <a:ea typeface="ＭＳ Ｐゴシック" panose="020B0600070205080204" pitchFamily="34" charset="-128"/>
-              </a:rPr>
-              <a:t>mod 4</a:t>
-            </a:r>
-          </a:p>
-          <a:p>
-            <a:r>
-              <a:rPr lang="da-DK" sz="2400" i="1" dirty="0">
-                <a:latin typeface="Calibri" panose="020F0502020204030204" pitchFamily="34" charset="0"/>
-                <a:ea typeface="ＭＳ Ｐゴシック" panose="020B0600070205080204" pitchFamily="34" charset="-128"/>
-              </a:rPr>
-              <a:t>g</a:t>
-            </a:r>
-            <a:r>
-              <a:rPr lang="da-DK" sz="2400" dirty="0">
-                <a:latin typeface="Calibri" panose="020F0502020204030204" pitchFamily="34" charset="0"/>
-                <a:ea typeface="ＭＳ Ｐゴシック" panose="020B0600070205080204" pitchFamily="34" charset="-128"/>
-              </a:rPr>
-              <a:t>(x) = (3</a:t>
-            </a:r>
-            <a:r>
-              <a:rPr lang="da-DK" sz="2400" i="1" dirty="0">
-                <a:latin typeface="Calibri" panose="020F0502020204030204" pitchFamily="34" charset="0"/>
-                <a:ea typeface="ＭＳ Ｐゴシック" panose="020B0600070205080204" pitchFamily="34" charset="-128"/>
-              </a:rPr>
-              <a:t>x</a:t>
-            </a:r>
-            <a:r>
-              <a:rPr lang="da-DK" sz="2400" dirty="0">
-                <a:latin typeface="Calibri" panose="020F0502020204030204" pitchFamily="34" charset="0"/>
-                <a:ea typeface="ＭＳ Ｐゴシック" panose="020B0600070205080204" pitchFamily="34" charset="-128"/>
-              </a:rPr>
-              <a:t> + 1) mod 4</a:t>
-            </a:r>
-          </a:p>
-        </p:txBody>
-      </p:sp>
-      <p:sp>
-        <p:nvSpPr>
-          <p:cNvPr id="2" name="Rectangle 1"/>
-          <p:cNvSpPr/>
-          <p:nvPr/>
-        </p:nvSpPr>
-        <p:spPr bwMode="auto">
-          <a:xfrm>
-            <a:off x="6084168" y="4786883"/>
-            <a:ext cx="288032" cy="730349"/>
-          </a:xfrm>
-          <a:prstGeom prst="rect">
-            <a:avLst/>
-          </a:prstGeom>
-          <a:noFill/>
-          <a:ln w="25400" cap="flat" cmpd="sng" algn="ctr">
-            <a:solidFill>
-              <a:schemeClr val="tx2"/>
-            </a:solidFill>
-            <a:prstDash val="solid"/>
-            <a:round/>
-            <a:headEnd type="none" w="med" len="med"/>
-            <a:tailEnd type="none" w="med" len="med"/>
-          </a:ln>
-          <a:effectLst/>
-          <a:extLst>
-            <a:ext uri="{909E8E84-426E-40DD-AFC4-6F175D3DCCD1}">
-              <a14:hiddenFill xmlns:a14="http://schemas.microsoft.com/office/drawing/2010/main">
-                <a:solidFill>
-                  <a:schemeClr val="accent1"/>
-                </a:solidFill>
-              </a14:hiddenFill>
-            </a:ext>
-            <a:ext uri="{AF507438-7753-43E0-B8FC-AC1667EBCBE1}">
-              <a14:hiddenEffects xmlns:a14="http://schemas.microsoft.com/office/drawing/2010/main">
-                <a:effectLst>
-                  <a:outerShdw dist="35921" dir="2700000" algn="ctr" rotWithShape="0">
-                    <a:schemeClr val="bg2"/>
-                  </a:outerShdw>
-                </a:effectLst>
-              </a14:hiddenEffects>
-            </a:ext>
-          </a:extLst>
-        </p:spPr>
-        <p:txBody>
-          <a:bodyPr vert="horz" wrap="square" lIns="91440" tIns="45720" rIns="91440" bIns="45720" numCol="1" rtlCol="0" anchor="b" anchorCtr="0" compatLnSpc="1">
-            <a:prstTxWarp prst="textNoShape">
-              <a:avLst/>
-            </a:prstTxWarp>
-          </a:bodyPr>
-          <a:lstStyle/>
-          <a:p>
-            <a:pPr marL="0" marR="0" indent="0" algn="l" defTabSz="914400" rtl="0" eaLnBrk="1" fontAlgn="base" latinLnBrk="0" hangingPunct="1">
-              <a:lnSpc>
-                <a:spcPct val="100000"/>
-              </a:lnSpc>
-              <a:spcBef>
-                <a:spcPct val="0"/>
-              </a:spcBef>
-              <a:spcAft>
-                <a:spcPct val="0"/>
-              </a:spcAft>
-              <a:buClrTx/>
-              <a:buSzTx/>
-              <a:buFontTx/>
-              <a:buNone/>
-              <a:tabLst/>
-            </a:pPr>
-            <a:endParaRPr kumimoji="0" lang="vi-VN" sz="1800" b="0" i="0" u="none" strike="noStrike" cap="none" normalizeH="0" baseline="0" smtClean="0">
-              <a:ln>
-                <a:noFill/>
-              </a:ln>
-              <a:solidFill>
-                <a:schemeClr val="tx1"/>
-              </a:solidFill>
-              <a:effectLst/>
-              <a:latin typeface="Tahoma" panose="020B0604030504040204" pitchFamily="34" charset="0"/>
-              <a:cs typeface="Tahoma" panose="020B0604030504040204" pitchFamily="34" charset="0"/>
-            </a:endParaRPr>
-          </a:p>
-        </p:txBody>
-      </p:sp>
-      <p:sp>
-        <p:nvSpPr>
-          <p:cNvPr id="9" name="Rectangle 8"/>
-          <p:cNvSpPr/>
-          <p:nvPr/>
-        </p:nvSpPr>
-        <p:spPr bwMode="auto">
-          <a:xfrm>
-            <a:off x="7164288" y="4797152"/>
-            <a:ext cx="288032" cy="730349"/>
-          </a:xfrm>
-          <a:prstGeom prst="rect">
-            <a:avLst/>
-          </a:prstGeom>
-          <a:noFill/>
-          <a:ln w="25400" cap="flat" cmpd="sng" algn="ctr">
-            <a:solidFill>
-              <a:schemeClr val="tx2"/>
-            </a:solidFill>
-            <a:prstDash val="solid"/>
-            <a:round/>
-            <a:headEnd type="none" w="med" len="med"/>
-            <a:tailEnd type="none" w="med" len="med"/>
-          </a:ln>
-          <a:effectLst/>
-          <a:extLst>
-            <a:ext uri="{909E8E84-426E-40DD-AFC4-6F175D3DCCD1}">
-              <a14:hiddenFill xmlns:a14="http://schemas.microsoft.com/office/drawing/2010/main">
-                <a:solidFill>
-                  <a:schemeClr val="accent1"/>
-                </a:solidFill>
-              </a14:hiddenFill>
-            </a:ext>
-            <a:ext uri="{AF507438-7753-43E0-B8FC-AC1667EBCBE1}">
-              <a14:hiddenEffects xmlns:a14="http://schemas.microsoft.com/office/drawing/2010/main">
-                <a:effectLst>
-                  <a:outerShdw dist="35921" dir="2700000" algn="ctr" rotWithShape="0">
-                    <a:schemeClr val="bg2"/>
-                  </a:outerShdw>
-                </a:effectLst>
-              </a14:hiddenEffects>
-            </a:ext>
-          </a:extLst>
-        </p:spPr>
-        <p:txBody>
-          <a:bodyPr vert="horz" wrap="square" lIns="91440" tIns="45720" rIns="91440" bIns="45720" numCol="1" rtlCol="0" anchor="b" anchorCtr="0" compatLnSpc="1">
-            <a:prstTxWarp prst="textNoShape">
-              <a:avLst/>
-            </a:prstTxWarp>
-          </a:bodyPr>
-          <a:lstStyle/>
-          <a:p>
-            <a:pPr marL="0" marR="0" indent="0" algn="l" defTabSz="914400" rtl="0" eaLnBrk="1" fontAlgn="base" latinLnBrk="0" hangingPunct="1">
-              <a:lnSpc>
-                <a:spcPct val="100000"/>
-              </a:lnSpc>
-              <a:spcBef>
-                <a:spcPct val="0"/>
-              </a:spcBef>
-              <a:spcAft>
-                <a:spcPct val="0"/>
-              </a:spcAft>
-              <a:buClrTx/>
-              <a:buSzTx/>
-              <a:buFontTx/>
-              <a:buNone/>
-              <a:tabLst/>
-            </a:pPr>
-            <a:endParaRPr kumimoji="0" lang="vi-VN" sz="1800" b="0" i="0" u="none" strike="noStrike" cap="none" normalizeH="0" baseline="0" smtClean="0">
-              <a:ln>
-                <a:noFill/>
-              </a:ln>
-              <a:solidFill>
-                <a:schemeClr val="tx1"/>
-              </a:solidFill>
-              <a:effectLst/>
-              <a:latin typeface="Tahoma" panose="020B0604030504040204" pitchFamily="34" charset="0"/>
-              <a:cs typeface="Tahoma" panose="020B0604030504040204" pitchFamily="34" charset="0"/>
-            </a:endParaRPr>
-          </a:p>
-        </p:txBody>
-      </p:sp>
-      <p:sp>
-        <p:nvSpPr>
-          <p:cNvPr id="10" name="Rectangle 9"/>
-          <p:cNvSpPr/>
-          <p:nvPr/>
-        </p:nvSpPr>
-        <p:spPr bwMode="auto">
-          <a:xfrm>
-            <a:off x="8244408" y="4797152"/>
-            <a:ext cx="288032" cy="730349"/>
-          </a:xfrm>
-          <a:prstGeom prst="rect">
-            <a:avLst/>
-          </a:prstGeom>
-          <a:noFill/>
-          <a:ln w="25400" cap="flat" cmpd="sng" algn="ctr">
-            <a:solidFill>
-              <a:schemeClr val="tx2"/>
-            </a:solidFill>
-            <a:prstDash val="solid"/>
-            <a:round/>
-            <a:headEnd type="none" w="med" len="med"/>
-            <a:tailEnd type="none" w="med" len="med"/>
-          </a:ln>
-          <a:effectLst/>
-          <a:extLst>
-            <a:ext uri="{909E8E84-426E-40DD-AFC4-6F175D3DCCD1}">
-              <a14:hiddenFill xmlns:a14="http://schemas.microsoft.com/office/drawing/2010/main">
-                <a:solidFill>
-                  <a:schemeClr val="accent1"/>
-                </a:solidFill>
-              </a14:hiddenFill>
-            </a:ext>
-            <a:ext uri="{AF507438-7753-43E0-B8FC-AC1667EBCBE1}">
-              <a14:hiddenEffects xmlns:a14="http://schemas.microsoft.com/office/drawing/2010/main">
-                <a:effectLst>
-                  <a:outerShdw dist="35921" dir="2700000" algn="ctr" rotWithShape="0">
-                    <a:schemeClr val="bg2"/>
-                  </a:outerShdw>
-                </a:effectLst>
-              </a14:hiddenEffects>
-            </a:ext>
-          </a:extLst>
-        </p:spPr>
-        <p:txBody>
-          <a:bodyPr vert="horz" wrap="square" lIns="91440" tIns="45720" rIns="91440" bIns="45720" numCol="1" rtlCol="0" anchor="b" anchorCtr="0" compatLnSpc="1">
-            <a:prstTxWarp prst="textNoShape">
-              <a:avLst/>
-            </a:prstTxWarp>
-          </a:bodyPr>
-          <a:lstStyle/>
-          <a:p>
-            <a:pPr marL="0" marR="0" indent="0" algn="l" defTabSz="914400" rtl="0" eaLnBrk="1" fontAlgn="base" latinLnBrk="0" hangingPunct="1">
-              <a:lnSpc>
-                <a:spcPct val="100000"/>
-              </a:lnSpc>
-              <a:spcBef>
-                <a:spcPct val="0"/>
-              </a:spcBef>
-              <a:spcAft>
-                <a:spcPct val="0"/>
-              </a:spcAft>
-              <a:buClrTx/>
-              <a:buSzTx/>
-              <a:buFontTx/>
-              <a:buNone/>
-              <a:tabLst/>
-            </a:pPr>
-            <a:endParaRPr kumimoji="0" lang="vi-VN" sz="1800" b="0" i="0" u="none" strike="noStrike" cap="none" normalizeH="0" baseline="0" smtClean="0">
-              <a:ln>
-                <a:noFill/>
-              </a:ln>
-              <a:solidFill>
-                <a:schemeClr val="tx1"/>
-              </a:solidFill>
-              <a:effectLst/>
-              <a:latin typeface="Tahoma" panose="020B0604030504040204" pitchFamily="34" charset="0"/>
-              <a:cs typeface="Tahoma" panose="020B0604030504040204" pitchFamily="34" charset="0"/>
-            </a:endParaRPr>
-          </a:p>
-        </p:txBody>
-      </p:sp>
-      <p:cxnSp>
-        <p:nvCxnSpPr>
-          <p:cNvPr id="4" name="Straight Connector 3"/>
-          <p:cNvCxnSpPr>
-            <a:stCxn id="2" idx="2"/>
-            <a:endCxn id="84996" idx="0"/>
-          </p:cNvCxnSpPr>
-          <p:nvPr/>
-        </p:nvCxnSpPr>
-        <p:spPr bwMode="auto">
-          <a:xfrm>
-            <a:off x="6228184" y="5517232"/>
-            <a:ext cx="543223" cy="426368"/>
-          </a:xfrm>
-          <a:prstGeom prst="line">
-            <a:avLst/>
-          </a:prstGeom>
-          <a:noFill/>
-          <a:ln w="9525" cap="flat" cmpd="sng" algn="ctr">
-            <a:solidFill>
-              <a:schemeClr val="tx1"/>
-            </a:solidFill>
-            <a:prstDash val="solid"/>
-            <a:round/>
-            <a:headEnd type="none" w="med" len="med"/>
-            <a:tailEnd type="none" w="med" len="med"/>
-          </a:ln>
-          <a:effectLst/>
-          <a:extLst>
-            <a:ext uri="{909E8E84-426E-40DD-AFC4-6F175D3DCCD1}">
-              <a14:hiddenFill xmlns:a14="http://schemas.microsoft.com/office/drawing/2010/main">
-                <a:solidFill>
-                  <a:schemeClr val="accent1"/>
-                </a:solidFill>
-              </a14:hiddenFill>
-            </a:ext>
-            <a:ext uri="{AF507438-7753-43E0-B8FC-AC1667EBCBE1}">
-              <a14:hiddenEffects xmlns:a14="http://schemas.microsoft.com/office/drawing/2010/main">
-                <a:effectLst>
-                  <a:outerShdw dist="35921" dir="2700000" algn="ctr" rotWithShape="0">
-                    <a:schemeClr val="bg2"/>
-                  </a:outerShdw>
-                </a:effectLst>
-              </a14:hiddenEffects>
-            </a:ext>
-          </a:extLst>
-        </p:spPr>
-      </p:cxnSp>
-      <p:cxnSp>
-        <p:nvCxnSpPr>
-          <p:cNvPr id="6" name="Straight Connector 5"/>
-          <p:cNvCxnSpPr>
-            <a:stCxn id="9" idx="2"/>
-            <a:endCxn id="84996" idx="0"/>
-          </p:cNvCxnSpPr>
-          <p:nvPr/>
-        </p:nvCxnSpPr>
-        <p:spPr bwMode="auto">
-          <a:xfrm flipH="1">
-            <a:off x="6771407" y="5527501"/>
-            <a:ext cx="536897" cy="416099"/>
-          </a:xfrm>
-          <a:prstGeom prst="line">
-            <a:avLst/>
-          </a:prstGeom>
-          <a:noFill/>
-          <a:ln w="9525" cap="flat" cmpd="sng" algn="ctr">
-            <a:solidFill>
-              <a:schemeClr val="tx1"/>
-            </a:solidFill>
-            <a:prstDash val="solid"/>
-            <a:round/>
-            <a:headEnd type="none" w="med" len="med"/>
-            <a:tailEnd type="none" w="med" len="med"/>
-          </a:ln>
-          <a:effectLst/>
-          <a:extLst>
-            <a:ext uri="{909E8E84-426E-40DD-AFC4-6F175D3DCCD1}">
-              <a14:hiddenFill xmlns:a14="http://schemas.microsoft.com/office/drawing/2010/main">
-                <a:solidFill>
-                  <a:schemeClr val="accent1"/>
-                </a:solidFill>
-              </a14:hiddenFill>
-            </a:ext>
-            <a:ext uri="{AF507438-7753-43E0-B8FC-AC1667EBCBE1}">
-              <a14:hiddenEffects xmlns:a14="http://schemas.microsoft.com/office/drawing/2010/main">
-                <a:effectLst>
-                  <a:outerShdw dist="35921" dir="2700000" algn="ctr" rotWithShape="0">
-                    <a:schemeClr val="bg2"/>
-                  </a:outerShdw>
-                </a:effectLst>
-              </a14:hiddenEffects>
-            </a:ext>
-          </a:extLst>
-        </p:spPr>
-      </p:cxnSp>
-      <p:cxnSp>
-        <p:nvCxnSpPr>
-          <p:cNvPr id="12" name="Straight Connector 11"/>
-          <p:cNvCxnSpPr>
-            <a:stCxn id="10" idx="2"/>
-            <a:endCxn id="84996" idx="0"/>
-          </p:cNvCxnSpPr>
-          <p:nvPr/>
-        </p:nvCxnSpPr>
-        <p:spPr bwMode="auto">
-          <a:xfrm flipH="1">
-            <a:off x="6771407" y="5527501"/>
-            <a:ext cx="1617017" cy="416099"/>
-          </a:xfrm>
-          <a:prstGeom prst="line">
-            <a:avLst/>
-          </a:prstGeom>
-          <a:noFill/>
-          <a:ln w="9525" cap="flat" cmpd="sng" algn="ctr">
-            <a:solidFill>
-              <a:schemeClr val="tx1"/>
-            </a:solidFill>
-            <a:prstDash val="solid"/>
-            <a:round/>
-            <a:headEnd type="none" w="med" len="med"/>
-            <a:tailEnd type="none" w="med" len="med"/>
-          </a:ln>
-          <a:effectLst/>
-          <a:extLst>
-            <a:ext uri="{909E8E84-426E-40DD-AFC4-6F175D3DCCD1}">
-              <a14:hiddenFill xmlns:a14="http://schemas.microsoft.com/office/drawing/2010/main">
-                <a:solidFill>
-                  <a:schemeClr val="accent1"/>
-                </a:solidFill>
-              </a14:hiddenFill>
-            </a:ext>
-            <a:ext uri="{AF507438-7753-43E0-B8FC-AC1667EBCBE1}">
-              <a14:hiddenEffects xmlns:a14="http://schemas.microsoft.com/office/drawing/2010/main">
-                <a:effectLst>
-                  <a:outerShdw dist="35921" dir="2700000" algn="ctr" rotWithShape="0">
-                    <a:schemeClr val="bg2"/>
-                  </a:outerShdw>
-                </a:effectLst>
-              </a14:hiddenEffects>
-            </a:ext>
-          </a:extLst>
-        </p:spPr>
-      </p:cxnSp>
-    </p:spTree>
-  </p:cSld>
-  <p:clrMapOvr>
-    <a:masterClrMapping/>
-  </p:clrMapOvr>
-  <p:timing>
-    <p:tnLst>
-      <p:par>
-        <p:cTn id="1" dur="indefinite" restart="never" nodeType="tmRoot"/>
-      </p:par>
-    </p:tnLst>
-  </p:timing>
-</p:sld>
-</file>
-
-<file path=ppt/slides/slide21.xml><?xml version="1.0" encoding="utf-8"?>
-<p:sld xmlns:a="http://schemas.openxmlformats.org/drawingml/2006/main" xmlns:r="http://schemas.openxmlformats.org/officeDocument/2006/relationships" xmlns:p="http://schemas.openxmlformats.org/presentationml/2006/main">
-  <p:cSld>
-    <p:spTree>
-      <p:nvGrpSpPr>
-        <p:cNvPr id="1" name=""/>
-        <p:cNvGrpSpPr/>
-        <p:nvPr/>
-      </p:nvGrpSpPr>
-      <p:grpSpPr>
-        <a:xfrm>
-          <a:off x="0" y="0"/>
-          <a:ext cx="0" cy="0"/>
-          <a:chOff x="0" y="0"/>
-          <a:chExt cx="0" cy="0"/>
-        </a:xfrm>
-      </p:grpSpPr>
-      <p:sp>
-        <p:nvSpPr>
-          <p:cNvPr id="5" name="Slide Number Placeholder 4"/>
-          <p:cNvSpPr>
-            <a:spLocks noGrp="1"/>
-          </p:cNvSpPr>
-          <p:nvPr>
-            <p:ph type="sldNum" sz="quarter" idx="12"/>
-          </p:nvPr>
-        </p:nvSpPr>
-        <p:spPr/>
-        <p:txBody>
-          <a:bodyPr/>
-          <a:lstStyle/>
-          <a:p>
-            <a:fld id="{F46F8909-08E8-471E-9BA5-D4D2516020A0}" type="slidenum">
-              <a:rPr lang="vi-VN"/>
-              <a:pPr/>
-              <a:t>21</a:t>
-            </a:fld>
-            <a:endParaRPr lang="vi-VN"/>
-          </a:p>
-        </p:txBody>
-      </p:sp>
-      <p:sp>
-        <p:nvSpPr>
-          <p:cNvPr id="753666" name="Rectangle 2"/>
-          <p:cNvSpPr>
-            <a:spLocks noGrp="1" noChangeArrowheads="1"/>
-          </p:cNvSpPr>
-          <p:nvPr>
-            <p:ph type="title"/>
-          </p:nvPr>
-        </p:nvSpPr>
-        <p:spPr>
-          <a:noFill/>
-          <a:ln/>
-          <a:extLst>
-            <a:ext uri="{91240B29-F687-4F45-9708-019B960494DF}">
-              <a14:hiddenLine xmlns:a14="http://schemas.microsoft.com/office/drawing/2010/main" w="9525" cap="flat" cmpd="sng" algn="ctr">
-                <a:solidFill>
-                  <a:schemeClr val="tx1"/>
-                </a:solidFill>
-                <a:prstDash val="solid"/>
-                <a:miter lim="800000"/>
-                <a:headEnd/>
-                <a:tailEnd/>
-              </a14:hiddenLine>
-            </a:ext>
-          </a:extLst>
-        </p:spPr>
-        <p:txBody>
-          <a:bodyPr/>
-          <a:lstStyle/>
-          <a:p>
-            <a:r>
-              <a:rPr lang="de-DE" smtClean="0"/>
-              <a:t>Đáp án (2)</a:t>
-            </a:r>
-            <a:endParaRPr lang="vi-VN" dirty="0"/>
-          </a:p>
-        </p:txBody>
-      </p:sp>
-      <p:pic>
-        <p:nvPicPr>
-          <p:cNvPr id="753668" name="Picture 11" descr="1949.png"/>
-          <p:cNvPicPr>
-            <a:picLocks noChangeAspect="1"/>
-          </p:cNvPicPr>
-          <p:nvPr/>
-        </p:nvPicPr>
-        <p:blipFill>
-          <a:blip r:embed="rId2">
-            <a:extLst>
-              <a:ext uri="{28A0092B-C50C-407E-A947-70E740481C1C}">
-                <a14:useLocalDpi xmlns:a14="http://schemas.microsoft.com/office/drawing/2010/main" val="0"/>
-              </a:ext>
-            </a:extLst>
-          </a:blip>
-          <a:srcRect/>
-          <a:stretch>
-            <a:fillRect/>
-          </a:stretch>
-        </p:blipFill>
-        <p:spPr bwMode="auto">
-          <a:xfrm>
-            <a:off x="2500313" y="2643188"/>
-            <a:ext cx="3790950" cy="2214562"/>
-          </a:xfrm>
-          <a:prstGeom prst="rect">
-            <a:avLst/>
-          </a:prstGeom>
-          <a:noFill/>
-          <a:ln>
-            <a:noFill/>
-          </a:ln>
-          <a:extLst>
-            <a:ext uri="{909E8E84-426E-40DD-AFC4-6F175D3DCCD1}">
-              <a14:hiddenFill xmlns:a14="http://schemas.microsoft.com/office/drawing/2010/main">
-                <a:solidFill>
-                  <a:srgbClr val="FFFFFF"/>
-                </a:solidFill>
-              </a14:hiddenFill>
-            </a:ext>
-            <a:ext uri="{91240B29-F687-4F45-9708-019B960494DF}">
-              <a14:hiddenLine xmlns:a14="http://schemas.microsoft.com/office/drawing/2010/main" w="9525">
-                <a:solidFill>
-                  <a:srgbClr val="000000"/>
-                </a:solidFill>
-                <a:miter lim="800000"/>
-                <a:headEnd/>
-                <a:tailEnd/>
-              </a14:hiddenLine>
-            </a:ext>
-          </a:extLst>
-        </p:spPr>
-      </p:pic>
-    </p:spTree>
-  </p:cSld>
-  <p:clrMapOvr>
-    <a:masterClrMapping/>
-  </p:clrMapOvr>
-</p:sld>
-</file>
-
-<file path=ppt/slides/slide22.xml><?xml version="1.0" encoding="utf-8"?>
-<p:sld xmlns:a="http://schemas.openxmlformats.org/drawingml/2006/main" xmlns:r="http://schemas.openxmlformats.org/officeDocument/2006/relationships" xmlns:p="http://schemas.openxmlformats.org/presentationml/2006/main">
-  <p:cSld>
-    <p:spTree>
-      <p:nvGrpSpPr>
-        <p:cNvPr id="1" name=""/>
-        <p:cNvGrpSpPr/>
-        <p:nvPr/>
-      </p:nvGrpSpPr>
-      <p:grpSpPr>
-        <a:xfrm>
-          <a:off x="0" y="0"/>
-          <a:ext cx="0" cy="0"/>
-          <a:chOff x="0" y="0"/>
-          <a:chExt cx="0" cy="0"/>
-        </a:xfrm>
-      </p:grpSpPr>
-      <p:sp>
-        <p:nvSpPr>
           <p:cNvPr id="6" name="Slide Number Placeholder 5"/>
           <p:cNvSpPr>
             <a:spLocks noGrp="1"/>
@@ -11813,7 +10273,7 @@
             <a:fld id="{07C7A66F-5227-494A-AE1D-9C23DDACF984}" type="slidenum">
               <a:rPr lang="vi-VN"/>
               <a:pPr/>
-              <a:t>22</a:t>
+              <a:t>19</a:t>
             </a:fld>
             <a:endParaRPr lang="vi-VN"/>
           </a:p>
@@ -12203,7 +10663,164 @@
 </p:sld>
 </file>
 
-<file path=ppt/slides/slide23.xml><?xml version="1.0" encoding="utf-8"?>
+<file path=ppt/slides/slide2.xml><?xml version="1.0" encoding="utf-8"?>
+<p:sld xmlns:a="http://schemas.openxmlformats.org/drawingml/2006/main" xmlns:r="http://schemas.openxmlformats.org/officeDocument/2006/relationships" xmlns:p="http://schemas.openxmlformats.org/presentationml/2006/main">
+  <p:cSld>
+    <p:spTree>
+      <p:nvGrpSpPr>
+        <p:cNvPr id="1" name=""/>
+        <p:cNvGrpSpPr/>
+        <p:nvPr/>
+      </p:nvGrpSpPr>
+      <p:grpSpPr>
+        <a:xfrm>
+          <a:off x="0" y="0"/>
+          <a:ext cx="0" cy="0"/>
+          <a:chOff x="0" y="0"/>
+          <a:chExt cx="0" cy="0"/>
+        </a:xfrm>
+      </p:grpSpPr>
+      <p:sp>
+        <p:nvSpPr>
+          <p:cNvPr id="6146" name="Rectangle 2"/>
+          <p:cNvSpPr>
+            <a:spLocks noGrp="1" noChangeArrowheads="1"/>
+          </p:cNvSpPr>
+          <p:nvPr>
+            <p:ph type="title"/>
+          </p:nvPr>
+        </p:nvSpPr>
+        <p:spPr/>
+        <p:txBody>
+          <a:bodyPr/>
+          <a:lstStyle/>
+          <a:p>
+            <a:pPr eaLnBrk="1" hangingPunct="1"/>
+            <a:r>
+              <a:rPr lang="vi-VN" sz="3600" dirty="0" smtClean="0"/>
+              <a:t>Nội dung chính</a:t>
+            </a:r>
+          </a:p>
+        </p:txBody>
+      </p:sp>
+      <p:sp>
+        <p:nvSpPr>
+          <p:cNvPr id="6147" name="Rectangle 3"/>
+          <p:cNvSpPr>
+            <a:spLocks noGrp="1" noChangeArrowheads="1"/>
+          </p:cNvSpPr>
+          <p:nvPr>
+            <p:ph type="body" idx="1"/>
+          </p:nvPr>
+        </p:nvSpPr>
+        <p:spPr>
+          <a:xfrm>
+            <a:off x="611560" y="2017713"/>
+            <a:ext cx="8343528" cy="4114800"/>
+          </a:xfrm>
+        </p:spPr>
+        <p:txBody>
+          <a:bodyPr/>
+          <a:lstStyle/>
+          <a:p>
+            <a:pPr algn="just" eaLnBrk="1" hangingPunct="1">
+              <a:defRPr/>
+            </a:pPr>
+            <a:r>
+              <a:rPr lang="vi-VN" smtClean="0"/>
+              <a:t>Phát hiện trùng lặp gần</a:t>
+            </a:r>
+            <a:endParaRPr lang="vi-VN" sz="2800" dirty="0" smtClean="0"/>
+          </a:p>
+          <a:p>
+            <a:pPr algn="just" eaLnBrk="1" hangingPunct="1">
+              <a:defRPr/>
+            </a:pPr>
+            <a:r>
+              <a:rPr lang="vi-VN" smtClean="0">
+                <a:solidFill>
+                  <a:schemeClr val="bg1">
+                    <a:lumMod val="65000"/>
+                  </a:schemeClr>
+                </a:solidFill>
+              </a:rPr>
+              <a:t>Tính độ tương đồng bằng hệ số Jaccard</a:t>
+            </a:r>
+          </a:p>
+          <a:p>
+            <a:pPr algn="just" eaLnBrk="1" hangingPunct="1">
+              <a:defRPr/>
+            </a:pPr>
+            <a:r>
+              <a:rPr lang="vi-VN" smtClean="0">
+                <a:solidFill>
+                  <a:schemeClr val="bg1">
+                    <a:lumMod val="65000"/>
+                  </a:schemeClr>
+                </a:solidFill>
+              </a:rPr>
+              <a:t>Ước lượng hệ số Jaccard sử dụng phép trộn</a:t>
+            </a:r>
+            <a:endParaRPr lang="vi-VN" sz="2800" dirty="0" smtClean="0">
+              <a:solidFill>
+                <a:schemeClr val="bg1">
+                  <a:lumMod val="65000"/>
+                </a:schemeClr>
+              </a:solidFill>
+            </a:endParaRPr>
+          </a:p>
+        </p:txBody>
+      </p:sp>
+      <p:sp>
+        <p:nvSpPr>
+          <p:cNvPr id="2" name="Slide Number Placeholder 1"/>
+          <p:cNvSpPr>
+            <a:spLocks noGrp="1"/>
+          </p:cNvSpPr>
+          <p:nvPr>
+            <p:ph type="sldNum" sz="quarter" idx="12"/>
+          </p:nvPr>
+        </p:nvSpPr>
+        <p:spPr/>
+        <p:txBody>
+          <a:bodyPr/>
+          <a:lstStyle/>
+          <a:p>
+            <a:pPr>
+              <a:defRPr/>
+            </a:pPr>
+            <a:fld id="{A81E07A1-38DA-436E-9EB2-1E501CB9FFA7}" type="slidenum">
+              <a:rPr lang="vi-VN" smtClean="0"/>
+              <a:pPr>
+                <a:defRPr/>
+              </a:pPr>
+              <a:t>2</a:t>
+            </a:fld>
+            <a:endParaRPr lang="vi-VN"/>
+          </a:p>
+        </p:txBody>
+      </p:sp>
+    </p:spTree>
+    <p:extLst>
+      <p:ext uri="{BB962C8B-B14F-4D97-AF65-F5344CB8AC3E}">
+        <p14:creationId xmlns:p14="http://schemas.microsoft.com/office/powerpoint/2010/main" val="2915804248"/>
+      </p:ext>
+    </p:extLst>
+  </p:cSld>
+  <p:clrMapOvr>
+    <a:masterClrMapping/>
+  </p:clrMapOvr>
+  <p:timing>
+    <p:tnLst>
+      <p:par>
+        <p:cTn id="1" dur="indefinite" restart="never" nodeType="tmRoot"/>
+      </p:par>
+    </p:tnLst>
+  </p:timing>
+</p:sld>
+</file>
+
+<file path=ppt/slides/slide20.xml><?xml version="1.0" encoding="utf-8"?>
 <p:sld xmlns:a="http://schemas.openxmlformats.org/drawingml/2006/main" xmlns:r="http://schemas.openxmlformats.org/officeDocument/2006/relationships" xmlns:p="http://schemas.openxmlformats.org/presentationml/2006/main">
   <p:cSld>
     <p:spTree>
@@ -12238,7 +10855,7 @@
             <a:fld id="{19AF545F-805B-410D-AA59-0650E20974B3}" type="slidenum">
               <a:rPr lang="vi-VN"/>
               <a:pPr/>
-              <a:t>23</a:t>
+              <a:t>20</a:t>
             </a:fld>
             <a:endParaRPr lang="vi-VN"/>
           </a:p>
@@ -12549,6 +11166,1916 @@
   <p:clrMapOvr>
     <a:masterClrMapping/>
   </p:clrMapOvr>
+</p:sld>
+</file>
+
+<file path=ppt/slides/slide21.xml><?xml version="1.0" encoding="utf-8"?>
+<p:sld xmlns:a="http://schemas.openxmlformats.org/drawingml/2006/main" xmlns:r="http://schemas.openxmlformats.org/officeDocument/2006/relationships" xmlns:p="http://schemas.openxmlformats.org/presentationml/2006/main">
+  <p:cSld>
+    <p:spTree>
+      <p:nvGrpSpPr>
+        <p:cNvPr id="1" name=""/>
+        <p:cNvGrpSpPr/>
+        <p:nvPr/>
+      </p:nvGrpSpPr>
+      <p:grpSpPr>
+        <a:xfrm>
+          <a:off x="0" y="0"/>
+          <a:ext cx="0" cy="0"/>
+          <a:chOff x="0" y="0"/>
+          <a:chExt cx="0" cy="0"/>
+        </a:xfrm>
+      </p:grpSpPr>
+      <p:sp>
+        <p:nvSpPr>
+          <p:cNvPr id="7" name="Slide Number Placeholder 4"/>
+          <p:cNvSpPr>
+            <a:spLocks noGrp="1"/>
+          </p:cNvSpPr>
+          <p:nvPr>
+            <p:ph type="sldNum" sz="quarter" idx="12"/>
+          </p:nvPr>
+        </p:nvSpPr>
+        <p:spPr/>
+        <p:txBody>
+          <a:bodyPr/>
+          <a:lstStyle/>
+          <a:p>
+            <a:fld id="{C61735BE-39B3-4277-B803-DCC972D3AF44}" type="slidenum">
+              <a:rPr lang="vi-VN"/>
+              <a:pPr/>
+              <a:t>21</a:t>
+            </a:fld>
+            <a:endParaRPr lang="vi-VN"/>
+          </a:p>
+        </p:txBody>
+      </p:sp>
+      <p:sp>
+        <p:nvSpPr>
+          <p:cNvPr id="749570" name="Rectangle 2"/>
+          <p:cNvSpPr>
+            <a:spLocks noGrp="1" noChangeArrowheads="1"/>
+          </p:cNvSpPr>
+          <p:nvPr>
+            <p:ph type="title"/>
+          </p:nvPr>
+        </p:nvSpPr>
+        <p:spPr>
+          <a:noFill/>
+          <a:ln/>
+          <a:extLst>
+            <a:ext uri="{91240B29-F687-4F45-9708-019B960494DF}">
+              <a14:hiddenLine xmlns:a14="http://schemas.microsoft.com/office/drawing/2010/main" w="9525" cap="flat" cmpd="sng" algn="ctr">
+                <a:solidFill>
+                  <a:schemeClr val="tx1"/>
+                </a:solidFill>
+                <a:prstDash val="solid"/>
+                <a:miter lim="800000"/>
+                <a:headEnd/>
+                <a:tailEnd/>
+              </a14:hiddenLine>
+            </a:ext>
+          </a:extLst>
+        </p:spPr>
+        <p:txBody>
+          <a:bodyPr/>
+          <a:lstStyle/>
+          <a:p>
+            <a:r>
+              <a:rPr lang="de-DE" dirty="0"/>
+              <a:t> Bài </a:t>
+            </a:r>
+            <a:r>
+              <a:rPr lang="de-DE" dirty="0" smtClean="0"/>
+              <a:t>tập 21.1</a:t>
+            </a:r>
+            <a:endParaRPr lang="vi-VN" dirty="0"/>
+          </a:p>
+        </p:txBody>
+      </p:sp>
+      <p:pic>
+        <p:nvPicPr>
+          <p:cNvPr id="749572" name="Picture 6" descr="1947.png"/>
+          <p:cNvPicPr>
+            <a:picLocks noChangeAspect="1"/>
+          </p:cNvPicPr>
+          <p:nvPr/>
+        </p:nvPicPr>
+        <p:blipFill>
+          <a:blip r:embed="rId2">
+            <a:extLst>
+              <a:ext uri="{28A0092B-C50C-407E-A947-70E740481C1C}">
+                <a14:useLocalDpi xmlns:a14="http://schemas.microsoft.com/office/drawing/2010/main" val="0"/>
+              </a:ext>
+            </a:extLst>
+          </a:blip>
+          <a:srcRect/>
+          <a:stretch>
+            <a:fillRect/>
+          </a:stretch>
+        </p:blipFill>
+        <p:spPr bwMode="auto">
+          <a:xfrm>
+            <a:off x="1619672" y="2636912"/>
+            <a:ext cx="2070100" cy="1785938"/>
+          </a:xfrm>
+          <a:prstGeom prst="rect">
+            <a:avLst/>
+          </a:prstGeom>
+          <a:noFill/>
+          <a:ln>
+            <a:noFill/>
+          </a:ln>
+          <a:extLst>
+            <a:ext uri="{909E8E84-426E-40DD-AFC4-6F175D3DCCD1}">
+              <a14:hiddenFill xmlns:a14="http://schemas.microsoft.com/office/drawing/2010/main">
+                <a:solidFill>
+                  <a:srgbClr val="FFFFFF"/>
+                </a:solidFill>
+              </a14:hiddenFill>
+            </a:ext>
+            <a:ext uri="{91240B29-F687-4F45-9708-019B960494DF}">
+              <a14:hiddenLine xmlns:a14="http://schemas.microsoft.com/office/drawing/2010/main" w="9525">
+                <a:solidFill>
+                  <a:srgbClr val="000000"/>
+                </a:solidFill>
+                <a:miter lim="800000"/>
+                <a:headEnd/>
+                <a:tailEnd/>
+              </a14:hiddenLine>
+            </a:ext>
+          </a:extLst>
+        </p:spPr>
+      </p:pic>
+      <p:sp>
+        <p:nvSpPr>
+          <p:cNvPr id="2" name="TextBox 1"/>
+          <p:cNvSpPr txBox="1"/>
+          <p:nvPr/>
+        </p:nvSpPr>
+        <p:spPr>
+          <a:xfrm>
+            <a:off x="1150938" y="2132856"/>
+            <a:ext cx="5221262" cy="400110"/>
+          </a:xfrm>
+          <a:prstGeom prst="rect">
+            <a:avLst/>
+          </a:prstGeom>
+          <a:noFill/>
+        </p:spPr>
+        <p:txBody>
+          <a:bodyPr wrap="square" rtlCol="0">
+            <a:spAutoFit/>
+          </a:bodyPr>
+          <a:lstStyle/>
+          <a:p>
+            <a:r>
+              <a:rPr lang="en-US" sz="2000" dirty="0" smtClean="0"/>
+              <a:t>Cho </a:t>
+            </a:r>
+            <a:r>
+              <a:rPr lang="en-US" sz="2000" dirty="0" err="1" smtClean="0"/>
+              <a:t>mô</a:t>
+            </a:r>
+            <a:r>
+              <a:rPr lang="en-US" sz="2000" dirty="0" smtClean="0"/>
+              <a:t> </a:t>
+            </a:r>
+            <a:r>
+              <a:rPr lang="en-US" sz="2000" dirty="0" err="1" smtClean="0"/>
+              <a:t>hình</a:t>
+            </a:r>
+            <a:r>
+              <a:rPr lang="en-US" sz="2000" dirty="0" smtClean="0"/>
+              <a:t> </a:t>
+            </a:r>
+            <a:r>
+              <a:rPr lang="en-US" sz="2000" dirty="0" err="1" smtClean="0"/>
+              <a:t>tập</a:t>
+            </a:r>
+            <a:r>
+              <a:rPr lang="en-US" sz="2000" dirty="0" smtClean="0"/>
+              <a:t> shingle </a:t>
+            </a:r>
+            <a:r>
+              <a:rPr lang="en-US" sz="2000" dirty="0" err="1" smtClean="0"/>
+              <a:t>của</a:t>
+            </a:r>
+            <a:r>
+              <a:rPr lang="en-US" sz="2000" dirty="0" smtClean="0"/>
+              <a:t> </a:t>
+            </a:r>
+            <a:r>
+              <a:rPr lang="en-US" sz="2000" dirty="0" err="1" smtClean="0"/>
+              <a:t>văn</a:t>
+            </a:r>
+            <a:r>
+              <a:rPr lang="en-US" sz="2000" dirty="0" smtClean="0"/>
+              <a:t> </a:t>
+            </a:r>
+            <a:r>
+              <a:rPr lang="en-US" sz="2000" dirty="0" err="1" smtClean="0"/>
+              <a:t>bản</a:t>
+            </a:r>
+            <a:endParaRPr lang="vi-VN" sz="2000" dirty="0"/>
+          </a:p>
+        </p:txBody>
+      </p:sp>
+      <p:sp>
+        <p:nvSpPr>
+          <p:cNvPr id="8" name="TextBox 7"/>
+          <p:cNvSpPr txBox="1"/>
+          <p:nvPr/>
+        </p:nvSpPr>
+        <p:spPr>
+          <a:xfrm>
+            <a:off x="1150938" y="4869160"/>
+            <a:ext cx="6013350" cy="707886"/>
+          </a:xfrm>
+          <a:prstGeom prst="rect">
+            <a:avLst/>
+          </a:prstGeom>
+          <a:noFill/>
+        </p:spPr>
+        <p:txBody>
+          <a:bodyPr wrap="square" rtlCol="0">
+            <a:spAutoFit/>
+          </a:bodyPr>
+          <a:lstStyle/>
+          <a:p>
+            <a:r>
+              <a:rPr lang="en-US" sz="2000" dirty="0" err="1" smtClean="0"/>
+              <a:t>Hãy</a:t>
+            </a:r>
+            <a:r>
+              <a:rPr lang="en-US" sz="2000" dirty="0" smtClean="0"/>
+              <a:t> </a:t>
+            </a:r>
+            <a:r>
+              <a:rPr lang="en-US" sz="2000" dirty="0" err="1" smtClean="0"/>
+              <a:t>ước</a:t>
+            </a:r>
+            <a:r>
+              <a:rPr lang="en-US" sz="2000" dirty="0" smtClean="0"/>
+              <a:t> </a:t>
+            </a:r>
+            <a:r>
+              <a:rPr lang="en-US" sz="2000" dirty="0" err="1" smtClean="0"/>
+              <a:t>lượng</a:t>
+            </a:r>
+            <a:r>
+              <a:rPr lang="en-US" sz="2000" dirty="0" smtClean="0"/>
+              <a:t> </a:t>
+            </a:r>
+            <a:r>
+              <a:rPr lang="en-US" sz="2000" dirty="0" err="1" smtClean="0"/>
+              <a:t>hệ</a:t>
+            </a:r>
+            <a:r>
+              <a:rPr lang="en-US" sz="2000" dirty="0" smtClean="0"/>
+              <a:t> </a:t>
+            </a:r>
+            <a:r>
+              <a:rPr lang="en-US" sz="2000" dirty="0" err="1" smtClean="0"/>
+              <a:t>số</a:t>
+            </a:r>
+            <a:r>
+              <a:rPr lang="en-US" sz="2000" dirty="0" smtClean="0"/>
+              <a:t> </a:t>
+            </a:r>
+            <a:r>
+              <a:rPr lang="en-US" sz="2000" dirty="0" err="1" smtClean="0"/>
+              <a:t>Jaccard</a:t>
+            </a:r>
+            <a:r>
+              <a:rPr lang="en-US" sz="2000" dirty="0" smtClean="0"/>
+              <a:t>:</a:t>
+            </a:r>
+          </a:p>
+          <a:p>
+            <a:r>
+              <a:rPr lang="en-US" sz="2000" dirty="0" smtClean="0"/>
+              <a:t>	J(d</a:t>
+            </a:r>
+            <a:r>
+              <a:rPr lang="en-US" sz="2000" baseline="-25000" dirty="0" smtClean="0"/>
+              <a:t>1</a:t>
+            </a:r>
+            <a:r>
+              <a:rPr lang="en-US" sz="2000" dirty="0" smtClean="0"/>
+              <a:t>, d</a:t>
+            </a:r>
+            <a:r>
+              <a:rPr lang="en-US" sz="2000" baseline="-25000" dirty="0" smtClean="0"/>
+              <a:t>2</a:t>
+            </a:r>
+            <a:r>
+              <a:rPr lang="en-US" sz="2000" dirty="0" smtClean="0"/>
+              <a:t>), J(d</a:t>
+            </a:r>
+            <a:r>
+              <a:rPr lang="en-US" sz="2000" baseline="-25000" dirty="0" smtClean="0"/>
+              <a:t>1</a:t>
+            </a:r>
+            <a:r>
+              <a:rPr lang="en-US" sz="2000" dirty="0" smtClean="0"/>
+              <a:t>, d</a:t>
+            </a:r>
+            <a:r>
+              <a:rPr lang="en-US" sz="2000" baseline="-25000" dirty="0" smtClean="0"/>
+              <a:t>3</a:t>
+            </a:r>
+            <a:r>
+              <a:rPr lang="en-US" sz="2000" dirty="0" smtClean="0"/>
+              <a:t>), J(d</a:t>
+            </a:r>
+            <a:r>
+              <a:rPr lang="en-US" sz="2000" baseline="-25000" dirty="0" smtClean="0"/>
+              <a:t>2</a:t>
+            </a:r>
+            <a:r>
+              <a:rPr lang="en-US" sz="2000" dirty="0" smtClean="0"/>
+              <a:t>, d</a:t>
+            </a:r>
+            <a:r>
+              <a:rPr lang="en-US" sz="2000" baseline="-25000" dirty="0" smtClean="0"/>
+              <a:t>3</a:t>
+            </a:r>
+            <a:r>
+              <a:rPr lang="en-US" sz="2000" dirty="0" smtClean="0"/>
+              <a:t>)</a:t>
+            </a:r>
+            <a:endParaRPr lang="vi-VN" sz="2000" dirty="0"/>
+          </a:p>
+        </p:txBody>
+      </p:sp>
+      <p:sp>
+        <p:nvSpPr>
+          <p:cNvPr id="9" name="Rectangle 8"/>
+          <p:cNvSpPr/>
+          <p:nvPr/>
+        </p:nvSpPr>
+        <p:spPr>
+          <a:xfrm>
+            <a:off x="5617594" y="4807971"/>
+            <a:ext cx="3357562" cy="830263"/>
+          </a:xfrm>
+          <a:prstGeom prst="rect">
+            <a:avLst/>
+          </a:prstGeom>
+        </p:spPr>
+        <p:txBody>
+          <a:bodyPr>
+            <a:spAutoFit/>
+          </a:bodyPr>
+          <a:lstStyle/>
+          <a:p>
+            <a:r>
+              <a:rPr lang="de-DE" sz="2400" i="1" dirty="0">
+                <a:latin typeface="Calibri" panose="020F0502020204030204" pitchFamily="34" charset="0"/>
+                <a:ea typeface="ＭＳ Ｐゴシック" panose="020B0600070205080204" pitchFamily="34" charset="-128"/>
+              </a:rPr>
+              <a:t>h</a:t>
+            </a:r>
+            <a:r>
+              <a:rPr lang="de-DE" sz="2400" dirty="0">
+                <a:latin typeface="Calibri" panose="020F0502020204030204" pitchFamily="34" charset="0"/>
+                <a:ea typeface="ＭＳ Ｐゴシック" panose="020B0600070205080204" pitchFamily="34" charset="-128"/>
+              </a:rPr>
+              <a:t>(</a:t>
+            </a:r>
+            <a:r>
+              <a:rPr lang="de-DE" sz="2400" i="1" dirty="0">
+                <a:latin typeface="Calibri" panose="020F0502020204030204" pitchFamily="34" charset="0"/>
+                <a:ea typeface="ＭＳ Ｐゴシック" panose="020B0600070205080204" pitchFamily="34" charset="-128"/>
+              </a:rPr>
+              <a:t>x</a:t>
+            </a:r>
+            <a:r>
+              <a:rPr lang="de-DE" sz="2400" dirty="0">
+                <a:latin typeface="Calibri" panose="020F0502020204030204" pitchFamily="34" charset="0"/>
+                <a:ea typeface="ＭＳ Ｐゴシック" panose="020B0600070205080204" pitchFamily="34" charset="-128"/>
+              </a:rPr>
+              <a:t>) = </a:t>
+            </a:r>
+            <a:r>
+              <a:rPr lang="de-DE" sz="2400" dirty="0" smtClean="0">
+                <a:latin typeface="Calibri" panose="020F0502020204030204" pitchFamily="34" charset="0"/>
+                <a:ea typeface="ＭＳ Ｐゴシック" panose="020B0600070205080204" pitchFamily="34" charset="-128"/>
+              </a:rPr>
+              <a:t>(5</a:t>
+            </a:r>
+            <a:r>
+              <a:rPr lang="de-DE" sz="2400" i="1" dirty="0" smtClean="0">
+                <a:latin typeface="Calibri" panose="020F0502020204030204" pitchFamily="34" charset="0"/>
+                <a:ea typeface="ＭＳ Ｐゴシック" panose="020B0600070205080204" pitchFamily="34" charset="-128"/>
+              </a:rPr>
+              <a:t>x</a:t>
+            </a:r>
+            <a:r>
+              <a:rPr lang="de-DE" sz="2400" dirty="0" smtClean="0">
+                <a:latin typeface="Calibri" panose="020F0502020204030204" pitchFamily="34" charset="0"/>
+                <a:ea typeface="ＭＳ Ｐゴシック" panose="020B0600070205080204" pitchFamily="34" charset="-128"/>
+              </a:rPr>
+              <a:t> </a:t>
+            </a:r>
+            <a:r>
+              <a:rPr lang="de-DE" sz="2400" dirty="0">
+                <a:latin typeface="Calibri" panose="020F0502020204030204" pitchFamily="34" charset="0"/>
+                <a:ea typeface="ＭＳ Ｐゴシック" panose="020B0600070205080204" pitchFamily="34" charset="-128"/>
+              </a:rPr>
+              <a:t>+ </a:t>
+            </a:r>
+            <a:r>
+              <a:rPr lang="de-DE" sz="2400" dirty="0" smtClean="0">
+                <a:latin typeface="Calibri" panose="020F0502020204030204" pitchFamily="34" charset="0"/>
+                <a:ea typeface="ＭＳ Ｐゴシック" panose="020B0600070205080204" pitchFamily="34" charset="-128"/>
+              </a:rPr>
+              <a:t>5) </a:t>
+            </a:r>
+            <a:r>
+              <a:rPr lang="de-DE" sz="2400" dirty="0">
+                <a:latin typeface="Calibri" panose="020F0502020204030204" pitchFamily="34" charset="0"/>
+                <a:ea typeface="ＭＳ Ｐゴシック" panose="020B0600070205080204" pitchFamily="34" charset="-128"/>
+              </a:rPr>
+              <a:t>mod 4</a:t>
+            </a:r>
+          </a:p>
+          <a:p>
+            <a:r>
+              <a:rPr lang="da-DK" sz="2400" i="1" dirty="0">
+                <a:latin typeface="Calibri" panose="020F0502020204030204" pitchFamily="34" charset="0"/>
+                <a:ea typeface="ＭＳ Ｐゴシック" panose="020B0600070205080204" pitchFamily="34" charset="-128"/>
+              </a:rPr>
+              <a:t>g</a:t>
+            </a:r>
+            <a:r>
+              <a:rPr lang="da-DK" sz="2400" dirty="0">
+                <a:latin typeface="Calibri" panose="020F0502020204030204" pitchFamily="34" charset="0"/>
+                <a:ea typeface="ＭＳ Ｐゴシック" panose="020B0600070205080204" pitchFamily="34" charset="-128"/>
+              </a:rPr>
+              <a:t>(x) = (3</a:t>
+            </a:r>
+            <a:r>
+              <a:rPr lang="da-DK" sz="2400" i="1" dirty="0">
+                <a:latin typeface="Calibri" panose="020F0502020204030204" pitchFamily="34" charset="0"/>
+                <a:ea typeface="ＭＳ Ｐゴシック" panose="020B0600070205080204" pitchFamily="34" charset="-128"/>
+              </a:rPr>
+              <a:t>x</a:t>
+            </a:r>
+            <a:r>
+              <a:rPr lang="da-DK" sz="2400" dirty="0">
+                <a:latin typeface="Calibri" panose="020F0502020204030204" pitchFamily="34" charset="0"/>
+                <a:ea typeface="ＭＳ Ｐゴシック" panose="020B0600070205080204" pitchFamily="34" charset="-128"/>
+              </a:rPr>
+              <a:t> + 1) mod 4</a:t>
+            </a:r>
+          </a:p>
+        </p:txBody>
+      </p:sp>
+    </p:spTree>
+  </p:cSld>
+  <p:clrMapOvr>
+    <a:masterClrMapping/>
+  </p:clrMapOvr>
+  <p:timing>
+    <p:tnLst>
+      <p:par>
+        <p:cTn id="1" dur="indefinite" restart="never" nodeType="tmRoot"/>
+      </p:par>
+    </p:tnLst>
+  </p:timing>
+</p:sld>
+</file>
+
+<file path=ppt/slides/slide22.xml><?xml version="1.0" encoding="utf-8"?>
+<p:sld xmlns:a="http://schemas.openxmlformats.org/drawingml/2006/main" xmlns:r="http://schemas.openxmlformats.org/officeDocument/2006/relationships" xmlns:p="http://schemas.openxmlformats.org/presentationml/2006/main">
+  <p:cSld>
+    <p:spTree>
+      <p:nvGrpSpPr>
+        <p:cNvPr id="1" name=""/>
+        <p:cNvGrpSpPr/>
+        <p:nvPr/>
+      </p:nvGrpSpPr>
+      <p:grpSpPr>
+        <a:xfrm>
+          <a:off x="0" y="0"/>
+          <a:ext cx="0" cy="0"/>
+          <a:chOff x="0" y="0"/>
+          <a:chExt cx="0" cy="0"/>
+        </a:xfrm>
+      </p:grpSpPr>
+      <p:sp>
+        <p:nvSpPr>
+          <p:cNvPr id="8" name="Slide Number Placeholder 4"/>
+          <p:cNvSpPr>
+            <a:spLocks noGrp="1"/>
+          </p:cNvSpPr>
+          <p:nvPr>
+            <p:ph type="sldNum" sz="quarter" idx="12"/>
+          </p:nvPr>
+        </p:nvSpPr>
+        <p:spPr/>
+        <p:txBody>
+          <a:bodyPr/>
+          <a:lstStyle/>
+          <a:p>
+            <a:fld id="{31EFD422-4EEE-417C-AA0D-1AE916CDBF3E}" type="slidenum">
+              <a:rPr lang="vi-VN"/>
+              <a:pPr/>
+              <a:t>22</a:t>
+            </a:fld>
+            <a:endParaRPr lang="vi-VN"/>
+          </a:p>
+        </p:txBody>
+      </p:sp>
+      <p:sp>
+        <p:nvSpPr>
+          <p:cNvPr id="751618" name="Rectangle 2"/>
+          <p:cNvSpPr>
+            <a:spLocks noGrp="1" noChangeArrowheads="1"/>
+          </p:cNvSpPr>
+          <p:nvPr>
+            <p:ph type="title"/>
+          </p:nvPr>
+        </p:nvSpPr>
+        <p:spPr>
+          <a:noFill/>
+          <a:ln/>
+          <a:extLst>
+            <a:ext uri="{91240B29-F687-4F45-9708-019B960494DF}">
+              <a14:hiddenLine xmlns:a14="http://schemas.microsoft.com/office/drawing/2010/main" w="9525" cap="flat" cmpd="sng" algn="ctr">
+                <a:solidFill>
+                  <a:schemeClr val="tx1"/>
+                </a:solidFill>
+                <a:prstDash val="solid"/>
+                <a:miter lim="800000"/>
+                <a:headEnd/>
+                <a:tailEnd/>
+              </a14:hiddenLine>
+            </a:ext>
+          </a:extLst>
+        </p:spPr>
+        <p:txBody>
+          <a:bodyPr/>
+          <a:lstStyle/>
+          <a:p>
+            <a:r>
+              <a:rPr lang="de-DE" dirty="0" smtClean="0"/>
+              <a:t>Đáp án</a:t>
+            </a:r>
+            <a:endParaRPr lang="vi-VN" dirty="0"/>
+          </a:p>
+        </p:txBody>
+      </p:sp>
+      <p:sp>
+        <p:nvSpPr>
+          <p:cNvPr id="84996" name="Text Box 3"/>
+          <p:cNvSpPr txBox="1">
+            <a:spLocks noChangeArrowheads="1"/>
+          </p:cNvSpPr>
+          <p:nvPr/>
+        </p:nvSpPr>
+        <p:spPr bwMode="auto">
+          <a:xfrm>
+            <a:off x="5364088" y="5943600"/>
+            <a:ext cx="2814637" cy="600075"/>
+          </a:xfrm>
+          <a:prstGeom prst="rect">
+            <a:avLst/>
+          </a:prstGeom>
+          <a:noFill/>
+          <a:ln w="9525">
+            <a:noFill/>
+            <a:round/>
+            <a:headEnd/>
+            <a:tailEnd/>
+          </a:ln>
+        </p:spPr>
+        <p:txBody>
+          <a:bodyPr/>
+          <a:lstStyle/>
+          <a:p>
+            <a:r>
+              <a:rPr lang="de-DE" sz="2400" dirty="0" smtClean="0">
+                <a:latin typeface="Calibri" panose="020F0502020204030204" pitchFamily="34" charset="0"/>
+                <a:ea typeface="ＭＳ Ｐゴシック" panose="020B0600070205080204" pitchFamily="34" charset="-128"/>
+              </a:rPr>
+              <a:t>Các biểu diễn khung</a:t>
+            </a:r>
+            <a:endParaRPr lang="de-DE" sz="2400" dirty="0">
+              <a:latin typeface="Calibri" panose="020F0502020204030204" pitchFamily="34" charset="0"/>
+              <a:ea typeface="ＭＳ Ｐゴシック" panose="020B0600070205080204" pitchFamily="34" charset="-128"/>
+            </a:endParaRPr>
+          </a:p>
+        </p:txBody>
+      </p:sp>
+      <p:pic>
+        <p:nvPicPr>
+          <p:cNvPr id="751621" name="Picture 8" descr="1948.png"/>
+          <p:cNvPicPr>
+            <a:picLocks noChangeAspect="1"/>
+          </p:cNvPicPr>
+          <p:nvPr/>
+        </p:nvPicPr>
+        <p:blipFill>
+          <a:blip r:embed="rId2">
+            <a:extLst>
+              <a:ext uri="{28A0092B-C50C-407E-A947-70E740481C1C}">
+                <a14:useLocalDpi xmlns:a14="http://schemas.microsoft.com/office/drawing/2010/main" val="0"/>
+              </a:ext>
+            </a:extLst>
+          </a:blip>
+          <a:srcRect/>
+          <a:stretch>
+            <a:fillRect/>
+          </a:stretch>
+        </p:blipFill>
+        <p:spPr bwMode="auto">
+          <a:xfrm>
+            <a:off x="500063" y="2071688"/>
+            <a:ext cx="2286000" cy="1924050"/>
+          </a:xfrm>
+          <a:prstGeom prst="rect">
+            <a:avLst/>
+          </a:prstGeom>
+          <a:noFill/>
+          <a:ln>
+            <a:noFill/>
+          </a:ln>
+          <a:extLst>
+            <a:ext uri="{909E8E84-426E-40DD-AFC4-6F175D3DCCD1}">
+              <a14:hiddenFill xmlns:a14="http://schemas.microsoft.com/office/drawing/2010/main">
+                <a:solidFill>
+                  <a:srgbClr val="FFFFFF"/>
+                </a:solidFill>
+              </a14:hiddenFill>
+            </a:ext>
+            <a:ext uri="{91240B29-F687-4F45-9708-019B960494DF}">
+              <a14:hiddenLine xmlns:a14="http://schemas.microsoft.com/office/drawing/2010/main" w="9525">
+                <a:solidFill>
+                  <a:srgbClr val="000000"/>
+                </a:solidFill>
+                <a:miter lim="800000"/>
+                <a:headEnd/>
+                <a:tailEnd/>
+              </a14:hiddenLine>
+            </a:ext>
+          </a:extLst>
+        </p:spPr>
+      </p:pic>
+      <p:pic>
+        <p:nvPicPr>
+          <p:cNvPr id="751622" name="Picture 9" descr="19482.png"/>
+          <p:cNvPicPr>
+            <a:picLocks noChangeAspect="1"/>
+          </p:cNvPicPr>
+          <p:nvPr/>
+        </p:nvPicPr>
+        <p:blipFill>
+          <a:blip r:embed="rId3">
+            <a:extLst>
+              <a:ext uri="{28A0092B-C50C-407E-A947-70E740481C1C}">
+                <a14:useLocalDpi xmlns:a14="http://schemas.microsoft.com/office/drawing/2010/main" val="0"/>
+              </a:ext>
+            </a:extLst>
+          </a:blip>
+          <a:srcRect/>
+          <a:stretch>
+            <a:fillRect/>
+          </a:stretch>
+        </p:blipFill>
+        <p:spPr bwMode="auto">
+          <a:xfrm>
+            <a:off x="4143375" y="1500188"/>
+            <a:ext cx="4746625" cy="4071937"/>
+          </a:xfrm>
+          <a:prstGeom prst="rect">
+            <a:avLst/>
+          </a:prstGeom>
+          <a:noFill/>
+          <a:ln>
+            <a:noFill/>
+          </a:ln>
+          <a:extLst>
+            <a:ext uri="{909E8E84-426E-40DD-AFC4-6F175D3DCCD1}">
+              <a14:hiddenFill xmlns:a14="http://schemas.microsoft.com/office/drawing/2010/main">
+                <a:solidFill>
+                  <a:srgbClr val="FFFFFF"/>
+                </a:solidFill>
+              </a14:hiddenFill>
+            </a:ext>
+            <a:ext uri="{91240B29-F687-4F45-9708-019B960494DF}">
+              <a14:hiddenLine xmlns:a14="http://schemas.microsoft.com/office/drawing/2010/main" w="9525">
+                <a:solidFill>
+                  <a:srgbClr val="000000"/>
+                </a:solidFill>
+                <a:miter lim="800000"/>
+                <a:headEnd/>
+                <a:tailEnd/>
+              </a14:hiddenLine>
+            </a:ext>
+          </a:extLst>
+        </p:spPr>
+      </p:pic>
+      <p:sp>
+        <p:nvSpPr>
+          <p:cNvPr id="11" name="Rectangle 10"/>
+          <p:cNvSpPr/>
+          <p:nvPr/>
+        </p:nvSpPr>
+        <p:spPr>
+          <a:xfrm>
+            <a:off x="483349" y="4009317"/>
+            <a:ext cx="3357562" cy="830263"/>
+          </a:xfrm>
+          <a:prstGeom prst="rect">
+            <a:avLst/>
+          </a:prstGeom>
+        </p:spPr>
+        <p:txBody>
+          <a:bodyPr>
+            <a:spAutoFit/>
+          </a:bodyPr>
+          <a:lstStyle/>
+          <a:p>
+            <a:r>
+              <a:rPr lang="de-DE" sz="2400" i="1" dirty="0">
+                <a:latin typeface="Calibri" panose="020F0502020204030204" pitchFamily="34" charset="0"/>
+                <a:ea typeface="ＭＳ Ｐゴシック" panose="020B0600070205080204" pitchFamily="34" charset="-128"/>
+              </a:rPr>
+              <a:t>h</a:t>
+            </a:r>
+            <a:r>
+              <a:rPr lang="de-DE" sz="2400" dirty="0">
+                <a:latin typeface="Calibri" panose="020F0502020204030204" pitchFamily="34" charset="0"/>
+                <a:ea typeface="ＭＳ Ｐゴシック" panose="020B0600070205080204" pitchFamily="34" charset="-128"/>
+              </a:rPr>
+              <a:t>(</a:t>
+            </a:r>
+            <a:r>
+              <a:rPr lang="de-DE" sz="2400" i="1" dirty="0">
+                <a:latin typeface="Calibri" panose="020F0502020204030204" pitchFamily="34" charset="0"/>
+                <a:ea typeface="ＭＳ Ｐゴシック" panose="020B0600070205080204" pitchFamily="34" charset="-128"/>
+              </a:rPr>
+              <a:t>x</a:t>
+            </a:r>
+            <a:r>
+              <a:rPr lang="de-DE" sz="2400" dirty="0">
+                <a:latin typeface="Calibri" panose="020F0502020204030204" pitchFamily="34" charset="0"/>
+                <a:ea typeface="ＭＳ Ｐゴシック" panose="020B0600070205080204" pitchFamily="34" charset="-128"/>
+              </a:rPr>
+              <a:t>) = </a:t>
+            </a:r>
+            <a:r>
+              <a:rPr lang="de-DE" sz="2400" dirty="0" smtClean="0">
+                <a:latin typeface="Calibri" panose="020F0502020204030204" pitchFamily="34" charset="0"/>
+                <a:ea typeface="ＭＳ Ｐゴシック" panose="020B0600070205080204" pitchFamily="34" charset="-128"/>
+              </a:rPr>
+              <a:t>(5</a:t>
+            </a:r>
+            <a:r>
+              <a:rPr lang="de-DE" sz="2400" i="1" dirty="0" smtClean="0">
+                <a:latin typeface="Calibri" panose="020F0502020204030204" pitchFamily="34" charset="0"/>
+                <a:ea typeface="ＭＳ Ｐゴシック" panose="020B0600070205080204" pitchFamily="34" charset="-128"/>
+              </a:rPr>
+              <a:t>x</a:t>
+            </a:r>
+            <a:r>
+              <a:rPr lang="de-DE" sz="2400" dirty="0" smtClean="0">
+                <a:latin typeface="Calibri" panose="020F0502020204030204" pitchFamily="34" charset="0"/>
+                <a:ea typeface="ＭＳ Ｐゴシック" panose="020B0600070205080204" pitchFamily="34" charset="-128"/>
+              </a:rPr>
+              <a:t> </a:t>
+            </a:r>
+            <a:r>
+              <a:rPr lang="de-DE" sz="2400" dirty="0">
+                <a:latin typeface="Calibri" panose="020F0502020204030204" pitchFamily="34" charset="0"/>
+                <a:ea typeface="ＭＳ Ｐゴシック" panose="020B0600070205080204" pitchFamily="34" charset="-128"/>
+              </a:rPr>
+              <a:t>+ </a:t>
+            </a:r>
+            <a:r>
+              <a:rPr lang="de-DE" sz="2400" dirty="0" smtClean="0">
+                <a:latin typeface="Calibri" panose="020F0502020204030204" pitchFamily="34" charset="0"/>
+                <a:ea typeface="ＭＳ Ｐゴシック" panose="020B0600070205080204" pitchFamily="34" charset="-128"/>
+              </a:rPr>
+              <a:t>5) </a:t>
+            </a:r>
+            <a:r>
+              <a:rPr lang="de-DE" sz="2400" dirty="0">
+                <a:latin typeface="Calibri" panose="020F0502020204030204" pitchFamily="34" charset="0"/>
+                <a:ea typeface="ＭＳ Ｐゴシック" panose="020B0600070205080204" pitchFamily="34" charset="-128"/>
+              </a:rPr>
+              <a:t>mod 4</a:t>
+            </a:r>
+          </a:p>
+          <a:p>
+            <a:r>
+              <a:rPr lang="da-DK" sz="2400" i="1" dirty="0">
+                <a:latin typeface="Calibri" panose="020F0502020204030204" pitchFamily="34" charset="0"/>
+                <a:ea typeface="ＭＳ Ｐゴシック" panose="020B0600070205080204" pitchFamily="34" charset="-128"/>
+              </a:rPr>
+              <a:t>g</a:t>
+            </a:r>
+            <a:r>
+              <a:rPr lang="da-DK" sz="2400" dirty="0">
+                <a:latin typeface="Calibri" panose="020F0502020204030204" pitchFamily="34" charset="0"/>
+                <a:ea typeface="ＭＳ Ｐゴシック" panose="020B0600070205080204" pitchFamily="34" charset="-128"/>
+              </a:rPr>
+              <a:t>(x) = (3</a:t>
+            </a:r>
+            <a:r>
+              <a:rPr lang="da-DK" sz="2400" i="1" dirty="0">
+                <a:latin typeface="Calibri" panose="020F0502020204030204" pitchFamily="34" charset="0"/>
+                <a:ea typeface="ＭＳ Ｐゴシック" panose="020B0600070205080204" pitchFamily="34" charset="-128"/>
+              </a:rPr>
+              <a:t>x</a:t>
+            </a:r>
+            <a:r>
+              <a:rPr lang="da-DK" sz="2400" dirty="0">
+                <a:latin typeface="Calibri" panose="020F0502020204030204" pitchFamily="34" charset="0"/>
+                <a:ea typeface="ＭＳ Ｐゴシック" panose="020B0600070205080204" pitchFamily="34" charset="-128"/>
+              </a:rPr>
+              <a:t> + 1) mod 4</a:t>
+            </a:r>
+          </a:p>
+        </p:txBody>
+      </p:sp>
+      <p:sp>
+        <p:nvSpPr>
+          <p:cNvPr id="2" name="Rectangle 1"/>
+          <p:cNvSpPr/>
+          <p:nvPr/>
+        </p:nvSpPr>
+        <p:spPr bwMode="auto">
+          <a:xfrm>
+            <a:off x="6084168" y="4786883"/>
+            <a:ext cx="288032" cy="730349"/>
+          </a:xfrm>
+          <a:prstGeom prst="rect">
+            <a:avLst/>
+          </a:prstGeom>
+          <a:noFill/>
+          <a:ln w="25400" cap="flat" cmpd="sng" algn="ctr">
+            <a:solidFill>
+              <a:schemeClr val="tx2"/>
+            </a:solidFill>
+            <a:prstDash val="solid"/>
+            <a:round/>
+            <a:headEnd type="none" w="med" len="med"/>
+            <a:tailEnd type="none" w="med" len="med"/>
+          </a:ln>
+          <a:effectLst/>
+          <a:extLst>
+            <a:ext uri="{909E8E84-426E-40DD-AFC4-6F175D3DCCD1}">
+              <a14:hiddenFill xmlns:a14="http://schemas.microsoft.com/office/drawing/2010/main">
+                <a:solidFill>
+                  <a:schemeClr val="accent1"/>
+                </a:solidFill>
+              </a14:hiddenFill>
+            </a:ext>
+            <a:ext uri="{AF507438-7753-43E0-B8FC-AC1667EBCBE1}">
+              <a14:hiddenEffects xmlns:a14="http://schemas.microsoft.com/office/drawing/2010/main">
+                <a:effectLst>
+                  <a:outerShdw dist="35921" dir="2700000" algn="ctr" rotWithShape="0">
+                    <a:schemeClr val="bg2"/>
+                  </a:outerShdw>
+                </a:effectLst>
+              </a14:hiddenEffects>
+            </a:ext>
+          </a:extLst>
+        </p:spPr>
+        <p:txBody>
+          <a:bodyPr vert="horz" wrap="square" lIns="91440" tIns="45720" rIns="91440" bIns="45720" numCol="1" rtlCol="0" anchor="b" anchorCtr="0" compatLnSpc="1">
+            <a:prstTxWarp prst="textNoShape">
+              <a:avLst/>
+            </a:prstTxWarp>
+          </a:bodyPr>
+          <a:lstStyle/>
+          <a:p>
+            <a:pPr marL="0" marR="0" indent="0" algn="l" defTabSz="914400" rtl="0" eaLnBrk="1" fontAlgn="base" latinLnBrk="0" hangingPunct="1">
+              <a:lnSpc>
+                <a:spcPct val="100000"/>
+              </a:lnSpc>
+              <a:spcBef>
+                <a:spcPct val="0"/>
+              </a:spcBef>
+              <a:spcAft>
+                <a:spcPct val="0"/>
+              </a:spcAft>
+              <a:buClrTx/>
+              <a:buSzTx/>
+              <a:buFontTx/>
+              <a:buNone/>
+              <a:tabLst/>
+            </a:pPr>
+            <a:endParaRPr kumimoji="0" lang="vi-VN" sz="1800" b="0" i="0" u="none" strike="noStrike" cap="none" normalizeH="0" baseline="0" smtClean="0">
+              <a:ln>
+                <a:noFill/>
+              </a:ln>
+              <a:solidFill>
+                <a:schemeClr val="tx1"/>
+              </a:solidFill>
+              <a:effectLst/>
+              <a:latin typeface="Tahoma" panose="020B0604030504040204" pitchFamily="34" charset="0"/>
+              <a:cs typeface="Tahoma" panose="020B0604030504040204" pitchFamily="34" charset="0"/>
+            </a:endParaRPr>
+          </a:p>
+        </p:txBody>
+      </p:sp>
+      <p:sp>
+        <p:nvSpPr>
+          <p:cNvPr id="9" name="Rectangle 8"/>
+          <p:cNvSpPr/>
+          <p:nvPr/>
+        </p:nvSpPr>
+        <p:spPr bwMode="auto">
+          <a:xfrm>
+            <a:off x="7164288" y="4797152"/>
+            <a:ext cx="288032" cy="730349"/>
+          </a:xfrm>
+          <a:prstGeom prst="rect">
+            <a:avLst/>
+          </a:prstGeom>
+          <a:noFill/>
+          <a:ln w="25400" cap="flat" cmpd="sng" algn="ctr">
+            <a:solidFill>
+              <a:schemeClr val="tx2"/>
+            </a:solidFill>
+            <a:prstDash val="solid"/>
+            <a:round/>
+            <a:headEnd type="none" w="med" len="med"/>
+            <a:tailEnd type="none" w="med" len="med"/>
+          </a:ln>
+          <a:effectLst/>
+          <a:extLst>
+            <a:ext uri="{909E8E84-426E-40DD-AFC4-6F175D3DCCD1}">
+              <a14:hiddenFill xmlns:a14="http://schemas.microsoft.com/office/drawing/2010/main">
+                <a:solidFill>
+                  <a:schemeClr val="accent1"/>
+                </a:solidFill>
+              </a14:hiddenFill>
+            </a:ext>
+            <a:ext uri="{AF507438-7753-43E0-B8FC-AC1667EBCBE1}">
+              <a14:hiddenEffects xmlns:a14="http://schemas.microsoft.com/office/drawing/2010/main">
+                <a:effectLst>
+                  <a:outerShdw dist="35921" dir="2700000" algn="ctr" rotWithShape="0">
+                    <a:schemeClr val="bg2"/>
+                  </a:outerShdw>
+                </a:effectLst>
+              </a14:hiddenEffects>
+            </a:ext>
+          </a:extLst>
+        </p:spPr>
+        <p:txBody>
+          <a:bodyPr vert="horz" wrap="square" lIns="91440" tIns="45720" rIns="91440" bIns="45720" numCol="1" rtlCol="0" anchor="b" anchorCtr="0" compatLnSpc="1">
+            <a:prstTxWarp prst="textNoShape">
+              <a:avLst/>
+            </a:prstTxWarp>
+          </a:bodyPr>
+          <a:lstStyle/>
+          <a:p>
+            <a:pPr marL="0" marR="0" indent="0" algn="l" defTabSz="914400" rtl="0" eaLnBrk="1" fontAlgn="base" latinLnBrk="0" hangingPunct="1">
+              <a:lnSpc>
+                <a:spcPct val="100000"/>
+              </a:lnSpc>
+              <a:spcBef>
+                <a:spcPct val="0"/>
+              </a:spcBef>
+              <a:spcAft>
+                <a:spcPct val="0"/>
+              </a:spcAft>
+              <a:buClrTx/>
+              <a:buSzTx/>
+              <a:buFontTx/>
+              <a:buNone/>
+              <a:tabLst/>
+            </a:pPr>
+            <a:endParaRPr kumimoji="0" lang="vi-VN" sz="1800" b="0" i="0" u="none" strike="noStrike" cap="none" normalizeH="0" baseline="0" smtClean="0">
+              <a:ln>
+                <a:noFill/>
+              </a:ln>
+              <a:solidFill>
+                <a:schemeClr val="tx1"/>
+              </a:solidFill>
+              <a:effectLst/>
+              <a:latin typeface="Tahoma" panose="020B0604030504040204" pitchFamily="34" charset="0"/>
+              <a:cs typeface="Tahoma" panose="020B0604030504040204" pitchFamily="34" charset="0"/>
+            </a:endParaRPr>
+          </a:p>
+        </p:txBody>
+      </p:sp>
+      <p:sp>
+        <p:nvSpPr>
+          <p:cNvPr id="10" name="Rectangle 9"/>
+          <p:cNvSpPr/>
+          <p:nvPr/>
+        </p:nvSpPr>
+        <p:spPr bwMode="auto">
+          <a:xfrm>
+            <a:off x="8244408" y="4797152"/>
+            <a:ext cx="288032" cy="730349"/>
+          </a:xfrm>
+          <a:prstGeom prst="rect">
+            <a:avLst/>
+          </a:prstGeom>
+          <a:noFill/>
+          <a:ln w="25400" cap="flat" cmpd="sng" algn="ctr">
+            <a:solidFill>
+              <a:schemeClr val="tx2"/>
+            </a:solidFill>
+            <a:prstDash val="solid"/>
+            <a:round/>
+            <a:headEnd type="none" w="med" len="med"/>
+            <a:tailEnd type="none" w="med" len="med"/>
+          </a:ln>
+          <a:effectLst/>
+          <a:extLst>
+            <a:ext uri="{909E8E84-426E-40DD-AFC4-6F175D3DCCD1}">
+              <a14:hiddenFill xmlns:a14="http://schemas.microsoft.com/office/drawing/2010/main">
+                <a:solidFill>
+                  <a:schemeClr val="accent1"/>
+                </a:solidFill>
+              </a14:hiddenFill>
+            </a:ext>
+            <a:ext uri="{AF507438-7753-43E0-B8FC-AC1667EBCBE1}">
+              <a14:hiddenEffects xmlns:a14="http://schemas.microsoft.com/office/drawing/2010/main">
+                <a:effectLst>
+                  <a:outerShdw dist="35921" dir="2700000" algn="ctr" rotWithShape="0">
+                    <a:schemeClr val="bg2"/>
+                  </a:outerShdw>
+                </a:effectLst>
+              </a14:hiddenEffects>
+            </a:ext>
+          </a:extLst>
+        </p:spPr>
+        <p:txBody>
+          <a:bodyPr vert="horz" wrap="square" lIns="91440" tIns="45720" rIns="91440" bIns="45720" numCol="1" rtlCol="0" anchor="b" anchorCtr="0" compatLnSpc="1">
+            <a:prstTxWarp prst="textNoShape">
+              <a:avLst/>
+            </a:prstTxWarp>
+          </a:bodyPr>
+          <a:lstStyle/>
+          <a:p>
+            <a:pPr marL="0" marR="0" indent="0" algn="l" defTabSz="914400" rtl="0" eaLnBrk="1" fontAlgn="base" latinLnBrk="0" hangingPunct="1">
+              <a:lnSpc>
+                <a:spcPct val="100000"/>
+              </a:lnSpc>
+              <a:spcBef>
+                <a:spcPct val="0"/>
+              </a:spcBef>
+              <a:spcAft>
+                <a:spcPct val="0"/>
+              </a:spcAft>
+              <a:buClrTx/>
+              <a:buSzTx/>
+              <a:buFontTx/>
+              <a:buNone/>
+              <a:tabLst/>
+            </a:pPr>
+            <a:endParaRPr kumimoji="0" lang="vi-VN" sz="1800" b="0" i="0" u="none" strike="noStrike" cap="none" normalizeH="0" baseline="0" smtClean="0">
+              <a:ln>
+                <a:noFill/>
+              </a:ln>
+              <a:solidFill>
+                <a:schemeClr val="tx1"/>
+              </a:solidFill>
+              <a:effectLst/>
+              <a:latin typeface="Tahoma" panose="020B0604030504040204" pitchFamily="34" charset="0"/>
+              <a:cs typeface="Tahoma" panose="020B0604030504040204" pitchFamily="34" charset="0"/>
+            </a:endParaRPr>
+          </a:p>
+        </p:txBody>
+      </p:sp>
+      <p:cxnSp>
+        <p:nvCxnSpPr>
+          <p:cNvPr id="4" name="Straight Connector 3"/>
+          <p:cNvCxnSpPr>
+            <a:stCxn id="2" idx="2"/>
+            <a:endCxn id="84996" idx="0"/>
+          </p:cNvCxnSpPr>
+          <p:nvPr/>
+        </p:nvCxnSpPr>
+        <p:spPr bwMode="auto">
+          <a:xfrm>
+            <a:off x="6228184" y="5517232"/>
+            <a:ext cx="543223" cy="426368"/>
+          </a:xfrm>
+          <a:prstGeom prst="line">
+            <a:avLst/>
+          </a:prstGeom>
+          <a:noFill/>
+          <a:ln w="9525" cap="flat" cmpd="sng" algn="ctr">
+            <a:solidFill>
+              <a:schemeClr val="tx1"/>
+            </a:solidFill>
+            <a:prstDash val="solid"/>
+            <a:round/>
+            <a:headEnd type="none" w="med" len="med"/>
+            <a:tailEnd type="none" w="med" len="med"/>
+          </a:ln>
+          <a:effectLst/>
+          <a:extLst>
+            <a:ext uri="{909E8E84-426E-40DD-AFC4-6F175D3DCCD1}">
+              <a14:hiddenFill xmlns:a14="http://schemas.microsoft.com/office/drawing/2010/main">
+                <a:solidFill>
+                  <a:schemeClr val="accent1"/>
+                </a:solidFill>
+              </a14:hiddenFill>
+            </a:ext>
+            <a:ext uri="{AF507438-7753-43E0-B8FC-AC1667EBCBE1}">
+              <a14:hiddenEffects xmlns:a14="http://schemas.microsoft.com/office/drawing/2010/main">
+                <a:effectLst>
+                  <a:outerShdw dist="35921" dir="2700000" algn="ctr" rotWithShape="0">
+                    <a:schemeClr val="bg2"/>
+                  </a:outerShdw>
+                </a:effectLst>
+              </a14:hiddenEffects>
+            </a:ext>
+          </a:extLst>
+        </p:spPr>
+      </p:cxnSp>
+      <p:cxnSp>
+        <p:nvCxnSpPr>
+          <p:cNvPr id="6" name="Straight Connector 5"/>
+          <p:cNvCxnSpPr>
+            <a:stCxn id="9" idx="2"/>
+            <a:endCxn id="84996" idx="0"/>
+          </p:cNvCxnSpPr>
+          <p:nvPr/>
+        </p:nvCxnSpPr>
+        <p:spPr bwMode="auto">
+          <a:xfrm flipH="1">
+            <a:off x="6771407" y="5527501"/>
+            <a:ext cx="536897" cy="416099"/>
+          </a:xfrm>
+          <a:prstGeom prst="line">
+            <a:avLst/>
+          </a:prstGeom>
+          <a:noFill/>
+          <a:ln w="9525" cap="flat" cmpd="sng" algn="ctr">
+            <a:solidFill>
+              <a:schemeClr val="tx1"/>
+            </a:solidFill>
+            <a:prstDash val="solid"/>
+            <a:round/>
+            <a:headEnd type="none" w="med" len="med"/>
+            <a:tailEnd type="none" w="med" len="med"/>
+          </a:ln>
+          <a:effectLst/>
+          <a:extLst>
+            <a:ext uri="{909E8E84-426E-40DD-AFC4-6F175D3DCCD1}">
+              <a14:hiddenFill xmlns:a14="http://schemas.microsoft.com/office/drawing/2010/main">
+                <a:solidFill>
+                  <a:schemeClr val="accent1"/>
+                </a:solidFill>
+              </a14:hiddenFill>
+            </a:ext>
+            <a:ext uri="{AF507438-7753-43E0-B8FC-AC1667EBCBE1}">
+              <a14:hiddenEffects xmlns:a14="http://schemas.microsoft.com/office/drawing/2010/main">
+                <a:effectLst>
+                  <a:outerShdw dist="35921" dir="2700000" algn="ctr" rotWithShape="0">
+                    <a:schemeClr val="bg2"/>
+                  </a:outerShdw>
+                </a:effectLst>
+              </a14:hiddenEffects>
+            </a:ext>
+          </a:extLst>
+        </p:spPr>
+      </p:cxnSp>
+      <p:cxnSp>
+        <p:nvCxnSpPr>
+          <p:cNvPr id="12" name="Straight Connector 11"/>
+          <p:cNvCxnSpPr>
+            <a:stCxn id="10" idx="2"/>
+            <a:endCxn id="84996" idx="0"/>
+          </p:cNvCxnSpPr>
+          <p:nvPr/>
+        </p:nvCxnSpPr>
+        <p:spPr bwMode="auto">
+          <a:xfrm flipH="1">
+            <a:off x="6771407" y="5527501"/>
+            <a:ext cx="1617017" cy="416099"/>
+          </a:xfrm>
+          <a:prstGeom prst="line">
+            <a:avLst/>
+          </a:prstGeom>
+          <a:noFill/>
+          <a:ln w="9525" cap="flat" cmpd="sng" algn="ctr">
+            <a:solidFill>
+              <a:schemeClr val="tx1"/>
+            </a:solidFill>
+            <a:prstDash val="solid"/>
+            <a:round/>
+            <a:headEnd type="none" w="med" len="med"/>
+            <a:tailEnd type="none" w="med" len="med"/>
+          </a:ln>
+          <a:effectLst/>
+          <a:extLst>
+            <a:ext uri="{909E8E84-426E-40DD-AFC4-6F175D3DCCD1}">
+              <a14:hiddenFill xmlns:a14="http://schemas.microsoft.com/office/drawing/2010/main">
+                <a:solidFill>
+                  <a:schemeClr val="accent1"/>
+                </a:solidFill>
+              </a14:hiddenFill>
+            </a:ext>
+            <a:ext uri="{AF507438-7753-43E0-B8FC-AC1667EBCBE1}">
+              <a14:hiddenEffects xmlns:a14="http://schemas.microsoft.com/office/drawing/2010/main">
+                <a:effectLst>
+                  <a:outerShdw dist="35921" dir="2700000" algn="ctr" rotWithShape="0">
+                    <a:schemeClr val="bg2"/>
+                  </a:outerShdw>
+                </a:effectLst>
+              </a14:hiddenEffects>
+            </a:ext>
+          </a:extLst>
+        </p:spPr>
+      </p:cxnSp>
+      <p:pic>
+        <p:nvPicPr>
+          <p:cNvPr id="14" name="Picture 11" descr="1949.png"/>
+          <p:cNvPicPr>
+            <a:picLocks noChangeAspect="1"/>
+          </p:cNvPicPr>
+          <p:nvPr/>
+        </p:nvPicPr>
+        <p:blipFill>
+          <a:blip r:embed="rId4">
+            <a:extLst>
+              <a:ext uri="{28A0092B-C50C-407E-A947-70E740481C1C}">
+                <a14:useLocalDpi xmlns:a14="http://schemas.microsoft.com/office/drawing/2010/main" val="0"/>
+              </a:ext>
+            </a:extLst>
+          </a:blip>
+          <a:srcRect/>
+          <a:stretch>
+            <a:fillRect/>
+          </a:stretch>
+        </p:blipFill>
+        <p:spPr bwMode="auto">
+          <a:xfrm>
+            <a:off x="500063" y="4821991"/>
+            <a:ext cx="3374037" cy="1971014"/>
+          </a:xfrm>
+          <a:prstGeom prst="rect">
+            <a:avLst/>
+          </a:prstGeom>
+          <a:noFill/>
+          <a:ln>
+            <a:noFill/>
+          </a:ln>
+          <a:extLst>
+            <a:ext uri="{909E8E84-426E-40DD-AFC4-6F175D3DCCD1}">
+              <a14:hiddenFill xmlns:a14="http://schemas.microsoft.com/office/drawing/2010/main">
+                <a:solidFill>
+                  <a:srgbClr val="FFFFFF"/>
+                </a:solidFill>
+              </a14:hiddenFill>
+            </a:ext>
+            <a:ext uri="{91240B29-F687-4F45-9708-019B960494DF}">
+              <a14:hiddenLine xmlns:a14="http://schemas.microsoft.com/office/drawing/2010/main" w="9525">
+                <a:solidFill>
+                  <a:srgbClr val="000000"/>
+                </a:solidFill>
+                <a:miter lim="800000"/>
+                <a:headEnd/>
+                <a:tailEnd/>
+              </a14:hiddenLine>
+            </a:ext>
+          </a:extLst>
+        </p:spPr>
+      </p:pic>
+    </p:spTree>
+  </p:cSld>
+  <p:clrMapOvr>
+    <a:masterClrMapping/>
+  </p:clrMapOvr>
+  <p:timing>
+    <p:tnLst>
+      <p:par>
+        <p:cTn id="1" dur="indefinite" restart="never" nodeType="tmRoot"/>
+      </p:par>
+    </p:tnLst>
+  </p:timing>
+</p:sld>
+</file>
+
+<file path=ppt/slides/slide23.xml><?xml version="1.0" encoding="utf-8"?>
+<p:sld xmlns:a="http://schemas.openxmlformats.org/drawingml/2006/main" xmlns:r="http://schemas.openxmlformats.org/officeDocument/2006/relationships" xmlns:p="http://schemas.openxmlformats.org/presentationml/2006/main">
+  <p:cSld>
+    <p:spTree>
+      <p:nvGrpSpPr>
+        <p:cNvPr id="1" name=""/>
+        <p:cNvGrpSpPr/>
+        <p:nvPr/>
+      </p:nvGrpSpPr>
+      <p:grpSpPr>
+        <a:xfrm>
+          <a:off x="0" y="0"/>
+          <a:ext cx="0" cy="0"/>
+          <a:chOff x="0" y="0"/>
+          <a:chExt cx="0" cy="0"/>
+        </a:xfrm>
+      </p:grpSpPr>
+      <p:sp>
+        <p:nvSpPr>
+          <p:cNvPr id="7" name="Slide Number Placeholder 4"/>
+          <p:cNvSpPr>
+            <a:spLocks noGrp="1"/>
+          </p:cNvSpPr>
+          <p:nvPr>
+            <p:ph type="sldNum" sz="quarter" idx="12"/>
+          </p:nvPr>
+        </p:nvSpPr>
+        <p:spPr/>
+        <p:txBody>
+          <a:bodyPr/>
+          <a:lstStyle/>
+          <a:p>
+            <a:fld id="{C61735BE-39B3-4277-B803-DCC972D3AF44}" type="slidenum">
+              <a:rPr lang="vi-VN"/>
+              <a:pPr/>
+              <a:t>23</a:t>
+            </a:fld>
+            <a:endParaRPr lang="vi-VN"/>
+          </a:p>
+        </p:txBody>
+      </p:sp>
+      <p:sp>
+        <p:nvSpPr>
+          <p:cNvPr id="749570" name="Rectangle 2"/>
+          <p:cNvSpPr>
+            <a:spLocks noGrp="1" noChangeArrowheads="1"/>
+          </p:cNvSpPr>
+          <p:nvPr>
+            <p:ph type="title"/>
+          </p:nvPr>
+        </p:nvSpPr>
+        <p:spPr>
+          <a:noFill/>
+          <a:ln/>
+          <a:extLst>
+            <a:ext uri="{91240B29-F687-4F45-9708-019B960494DF}">
+              <a14:hiddenLine xmlns:a14="http://schemas.microsoft.com/office/drawing/2010/main" w="9525" cap="flat" cmpd="sng" algn="ctr">
+                <a:solidFill>
+                  <a:schemeClr val="tx1"/>
+                </a:solidFill>
+                <a:prstDash val="solid"/>
+                <a:miter lim="800000"/>
+                <a:headEnd/>
+                <a:tailEnd/>
+              </a14:hiddenLine>
+            </a:ext>
+          </a:extLst>
+        </p:spPr>
+        <p:txBody>
+          <a:bodyPr/>
+          <a:lstStyle/>
+          <a:p>
+            <a:r>
+              <a:rPr lang="de-DE" dirty="0"/>
+              <a:t> Bài </a:t>
+            </a:r>
+            <a:r>
+              <a:rPr lang="de-DE" dirty="0" smtClean="0"/>
+              <a:t>tập 21.2</a:t>
+            </a:r>
+            <a:endParaRPr lang="vi-VN" dirty="0"/>
+          </a:p>
+        </p:txBody>
+      </p:sp>
+      <p:sp>
+        <p:nvSpPr>
+          <p:cNvPr id="2" name="TextBox 1"/>
+          <p:cNvSpPr txBox="1"/>
+          <p:nvPr/>
+        </p:nvSpPr>
+        <p:spPr>
+          <a:xfrm>
+            <a:off x="611560" y="2132856"/>
+            <a:ext cx="8352928" cy="1938992"/>
+          </a:xfrm>
+          <a:prstGeom prst="rect">
+            <a:avLst/>
+          </a:prstGeom>
+          <a:noFill/>
+        </p:spPr>
+        <p:txBody>
+          <a:bodyPr wrap="square" rtlCol="0">
+            <a:spAutoFit/>
+          </a:bodyPr>
+          <a:lstStyle/>
+          <a:p>
+            <a:r>
+              <a:rPr lang="en-US" sz="2000" dirty="0" err="1" smtClean="0"/>
+              <a:t>Xét</a:t>
+            </a:r>
+            <a:r>
+              <a:rPr lang="en-US" sz="2000" dirty="0" smtClean="0"/>
+              <a:t> </a:t>
+            </a:r>
+            <a:r>
+              <a:rPr lang="en-US" sz="2000" dirty="0" err="1" smtClean="0"/>
+              <a:t>một</a:t>
+            </a:r>
+            <a:r>
+              <a:rPr lang="en-US" sz="2000" dirty="0" smtClean="0"/>
+              <a:t> </a:t>
+            </a:r>
+            <a:r>
+              <a:rPr lang="en-US" sz="2000" dirty="0" err="1" smtClean="0"/>
+              <a:t>cách</a:t>
+            </a:r>
+            <a:r>
+              <a:rPr lang="en-US" sz="2000" dirty="0" smtClean="0"/>
+              <a:t> </a:t>
+            </a:r>
+            <a:r>
+              <a:rPr lang="en-US" sz="2000" dirty="0" err="1" smtClean="0"/>
+              <a:t>ước</a:t>
+            </a:r>
+            <a:r>
+              <a:rPr lang="en-US" sz="2000" dirty="0" smtClean="0"/>
+              <a:t> </a:t>
+            </a:r>
+            <a:r>
+              <a:rPr lang="en-US" sz="2000" dirty="0" err="1" smtClean="0"/>
+              <a:t>lượng</a:t>
+            </a:r>
+            <a:r>
+              <a:rPr lang="en-US" sz="2000" dirty="0" smtClean="0"/>
+              <a:t> </a:t>
+            </a:r>
+            <a:r>
+              <a:rPr lang="en-US" sz="2000" dirty="0" err="1" smtClean="0"/>
+              <a:t>khác</a:t>
+            </a:r>
+            <a:r>
+              <a:rPr lang="en-US" sz="2000" dirty="0" smtClean="0"/>
+              <a:t>: </a:t>
+            </a:r>
+            <a:r>
+              <a:rPr lang="en-US" sz="2000" dirty="0" err="1" smtClean="0"/>
+              <a:t>Lấy</a:t>
+            </a:r>
+            <a:r>
+              <a:rPr lang="en-US" sz="2000" dirty="0" smtClean="0"/>
+              <a:t> </a:t>
+            </a:r>
+            <a:r>
+              <a:rPr lang="en-US" sz="2000" dirty="0" err="1" smtClean="0"/>
+              <a:t>ngẫu</a:t>
+            </a:r>
+            <a:r>
+              <a:rPr lang="en-US" sz="2000" dirty="0" smtClean="0"/>
+              <a:t> </a:t>
+            </a:r>
+            <a:r>
+              <a:rPr lang="en-US" sz="2000" dirty="0" err="1" smtClean="0"/>
+              <a:t>nhiên</a:t>
+            </a:r>
+            <a:r>
+              <a:rPr lang="en-US" sz="2000" dirty="0" smtClean="0"/>
+              <a:t> </a:t>
+            </a:r>
+            <a:r>
+              <a:rPr lang="en-US" sz="2000" dirty="0" err="1" smtClean="0"/>
+              <a:t>một</a:t>
+            </a:r>
+            <a:r>
+              <a:rPr lang="en-US" sz="2000" dirty="0" smtClean="0"/>
+              <a:t> </a:t>
+            </a:r>
+            <a:r>
+              <a:rPr lang="en-US" sz="2000" dirty="0" err="1" smtClean="0"/>
+              <a:t>tập</a:t>
+            </a:r>
+            <a:r>
+              <a:rPr lang="en-US" sz="2000" dirty="0" smtClean="0"/>
+              <a:t> con </a:t>
+            </a:r>
+            <a:r>
+              <a:rPr lang="en-US" sz="2000" dirty="0" err="1" smtClean="0"/>
+              <a:t>các</a:t>
+            </a:r>
+            <a:r>
+              <a:rPr lang="en-US" sz="2000" dirty="0" smtClean="0"/>
+              <a:t> </a:t>
+            </a:r>
+            <a:r>
+              <a:rPr lang="en-US" sz="2000" dirty="0" err="1" smtClean="0"/>
+              <a:t>giá</a:t>
+            </a:r>
+            <a:r>
+              <a:rPr lang="en-US" sz="2000" dirty="0" smtClean="0"/>
+              <a:t> </a:t>
+            </a:r>
+            <a:r>
+              <a:rPr lang="en-US" sz="2000" dirty="0" err="1" smtClean="0"/>
+              <a:t>trị</a:t>
+            </a:r>
+            <a:r>
+              <a:rPr lang="en-US" sz="2000" dirty="0" smtClean="0"/>
+              <a:t> </a:t>
+            </a:r>
+            <a:r>
+              <a:rPr lang="en-US" sz="2000" dirty="0" err="1" smtClean="0"/>
+              <a:t>từ</a:t>
+            </a:r>
+            <a:r>
+              <a:rPr lang="en-US" sz="2000" dirty="0" smtClean="0"/>
+              <a:t> </a:t>
+            </a:r>
+            <a:r>
+              <a:rPr lang="en-US" sz="2000" dirty="0" err="1" smtClean="0"/>
+              <a:t>tập</a:t>
+            </a:r>
+            <a:r>
+              <a:rPr lang="en-US" sz="2000" dirty="0" smtClean="0"/>
+              <a:t> </a:t>
+            </a:r>
+            <a:r>
+              <a:rPr lang="en-US" sz="2000" dirty="0" err="1" smtClean="0"/>
+              <a:t>các</a:t>
+            </a:r>
+            <a:r>
+              <a:rPr lang="en-US" sz="2000" dirty="0" smtClean="0"/>
+              <a:t> </a:t>
+            </a:r>
+            <a:r>
+              <a:rPr lang="en-US" sz="2000" dirty="0" err="1" smtClean="0"/>
+              <a:t>giá</a:t>
+            </a:r>
+            <a:r>
+              <a:rPr lang="en-US" sz="2000" dirty="0" smtClean="0"/>
+              <a:t> </a:t>
+            </a:r>
+            <a:r>
+              <a:rPr lang="en-US" sz="2000" dirty="0" err="1" smtClean="0"/>
+              <a:t>trị</a:t>
+            </a:r>
+            <a:r>
+              <a:rPr lang="en-US" sz="2000" dirty="0" smtClean="0"/>
+              <a:t> </a:t>
+            </a:r>
+            <a:r>
+              <a:rPr lang="en-US" sz="2000" dirty="0" err="1" smtClean="0"/>
+              <a:t>của</a:t>
+            </a:r>
+            <a:r>
+              <a:rPr lang="en-US" sz="2000" dirty="0" smtClean="0"/>
+              <a:t> </a:t>
+            </a:r>
+            <a:r>
+              <a:rPr lang="en-US" sz="2000" dirty="0" err="1" smtClean="0"/>
+              <a:t>cả</a:t>
+            </a:r>
+            <a:r>
+              <a:rPr lang="en-US" sz="2000" dirty="0" smtClean="0"/>
+              <a:t> S</a:t>
+            </a:r>
+            <a:r>
+              <a:rPr lang="en-US" sz="2000" baseline="-25000" dirty="0" smtClean="0"/>
+              <a:t>1 </a:t>
+            </a:r>
+            <a:r>
+              <a:rPr lang="en-US" sz="2000" dirty="0" err="1" smtClean="0"/>
+              <a:t>và</a:t>
+            </a:r>
+            <a:r>
+              <a:rPr lang="en-US" sz="2000" dirty="0" smtClean="0"/>
+              <a:t> S</a:t>
+            </a:r>
+            <a:r>
+              <a:rPr lang="en-US" sz="2000" baseline="-25000" dirty="0" smtClean="0"/>
+              <a:t>2</a:t>
+            </a:r>
+            <a:r>
+              <a:rPr lang="en-US" sz="2000" dirty="0" smtClean="0"/>
+              <a:t>. </a:t>
+            </a:r>
+            <a:r>
+              <a:rPr lang="en-US" sz="2000" dirty="0" err="1" smtClean="0"/>
+              <a:t>Sau</a:t>
+            </a:r>
+            <a:r>
+              <a:rPr lang="en-US" sz="2000" dirty="0" smtClean="0"/>
+              <a:t> </a:t>
+            </a:r>
+            <a:r>
+              <a:rPr lang="en-US" sz="2000" dirty="0" err="1" smtClean="0"/>
+              <a:t>đó</a:t>
+            </a:r>
+            <a:r>
+              <a:rPr lang="en-US" sz="2000" dirty="0" smtClean="0"/>
+              <a:t> </a:t>
+            </a:r>
+            <a:r>
+              <a:rPr lang="en-US" sz="2000" dirty="0" err="1" smtClean="0"/>
+              <a:t>tính</a:t>
+            </a:r>
+            <a:r>
+              <a:rPr lang="en-US" sz="2000" dirty="0" smtClean="0"/>
+              <a:t> </a:t>
+            </a:r>
+            <a:r>
+              <a:rPr lang="en-US" sz="2000" dirty="0" err="1" smtClean="0"/>
+              <a:t>hệ</a:t>
+            </a:r>
+            <a:r>
+              <a:rPr lang="en-US" sz="2000" dirty="0" smtClean="0"/>
+              <a:t> </a:t>
+            </a:r>
+            <a:r>
+              <a:rPr lang="en-US" sz="2000" dirty="0" err="1" smtClean="0"/>
+              <a:t>số</a:t>
+            </a:r>
+            <a:r>
+              <a:rPr lang="en-US" sz="2000" dirty="0" smtClean="0"/>
+              <a:t> </a:t>
+            </a:r>
+            <a:r>
+              <a:rPr lang="en-US" sz="2000" dirty="0" err="1" smtClean="0"/>
+              <a:t>Jaccard</a:t>
+            </a:r>
+            <a:r>
+              <a:rPr lang="en-US" sz="2000" dirty="0" smtClean="0"/>
+              <a:t> </a:t>
+            </a:r>
+            <a:r>
+              <a:rPr lang="en-US" sz="2000" dirty="0" err="1" smtClean="0"/>
+              <a:t>giữa</a:t>
+            </a:r>
+            <a:r>
+              <a:rPr lang="en-US" sz="2000" dirty="0" smtClean="0"/>
+              <a:t> </a:t>
+            </a:r>
+            <a:r>
+              <a:rPr lang="en-US" sz="2000" dirty="0" err="1" smtClean="0"/>
+              <a:t>các</a:t>
+            </a:r>
+            <a:r>
+              <a:rPr lang="en-US" sz="2000" dirty="0" smtClean="0"/>
+              <a:t> </a:t>
+            </a:r>
+            <a:r>
+              <a:rPr lang="en-US" sz="2000" dirty="0" err="1" smtClean="0"/>
+              <a:t>tập</a:t>
+            </a:r>
+            <a:r>
+              <a:rPr lang="en-US" sz="2000" dirty="0" smtClean="0"/>
+              <a:t> con </a:t>
+            </a:r>
+            <a:r>
+              <a:rPr lang="en-US" sz="2000" dirty="0" err="1" smtClean="0"/>
+              <a:t>như</a:t>
+            </a:r>
+            <a:r>
+              <a:rPr lang="en-US" sz="2000" dirty="0" smtClean="0"/>
+              <a:t> </a:t>
+            </a:r>
+            <a:r>
+              <a:rPr lang="en-US" sz="2000" dirty="0" err="1" smtClean="0"/>
+              <a:t>vậy</a:t>
+            </a:r>
+            <a:r>
+              <a:rPr lang="en-US" sz="2000" dirty="0" smtClean="0"/>
+              <a:t>. </a:t>
+            </a:r>
+          </a:p>
+          <a:p>
+            <a:r>
+              <a:rPr lang="en-US" sz="2000" dirty="0" smtClean="0"/>
+              <a:t>a) </a:t>
+            </a:r>
+            <a:r>
+              <a:rPr lang="en-US" sz="2000" dirty="0" err="1" smtClean="0"/>
+              <a:t>Hãy</a:t>
+            </a:r>
+            <a:r>
+              <a:rPr lang="en-US" sz="2000" dirty="0" smtClean="0"/>
+              <a:t> </a:t>
+            </a:r>
+            <a:r>
+              <a:rPr lang="en-US" sz="2000" dirty="0" err="1" smtClean="0"/>
+              <a:t>chứng</a:t>
+            </a:r>
+            <a:r>
+              <a:rPr lang="en-US" sz="2000" dirty="0" smtClean="0"/>
+              <a:t> minh </a:t>
+            </a:r>
+            <a:r>
+              <a:rPr lang="en-US" sz="2000" dirty="0" err="1" smtClean="0"/>
+              <a:t>đây</a:t>
+            </a:r>
+            <a:r>
+              <a:rPr lang="en-US" sz="2000" dirty="0" smtClean="0"/>
+              <a:t> </a:t>
+            </a:r>
+            <a:r>
+              <a:rPr lang="en-US" sz="2000" dirty="0" err="1" smtClean="0"/>
+              <a:t>là</a:t>
+            </a:r>
+            <a:r>
+              <a:rPr lang="en-US" sz="2000" dirty="0" smtClean="0"/>
+              <a:t> </a:t>
+            </a:r>
+            <a:r>
+              <a:rPr lang="en-US" sz="2000" dirty="0" err="1" smtClean="0"/>
+              <a:t>một</a:t>
+            </a:r>
+            <a:r>
+              <a:rPr lang="en-US" sz="2000" dirty="0" smtClean="0"/>
+              <a:t> </a:t>
+            </a:r>
+            <a:r>
+              <a:rPr lang="en-US" sz="2000" dirty="0" err="1" smtClean="0"/>
+              <a:t>cách</a:t>
+            </a:r>
+            <a:r>
+              <a:rPr lang="en-US" sz="2000" dirty="0" smtClean="0"/>
+              <a:t> </a:t>
+            </a:r>
+            <a:r>
+              <a:rPr lang="en-US" sz="2000" dirty="0" err="1" smtClean="0"/>
+              <a:t>ước</a:t>
+            </a:r>
+            <a:r>
+              <a:rPr lang="en-US" sz="2000" dirty="0" smtClean="0"/>
+              <a:t> </a:t>
+            </a:r>
+            <a:r>
+              <a:rPr lang="en-US" sz="2000" dirty="0" err="1" smtClean="0"/>
+              <a:t>lượng</a:t>
+            </a:r>
+            <a:r>
+              <a:rPr lang="en-US" sz="2000" dirty="0" smtClean="0"/>
+              <a:t> </a:t>
+            </a:r>
+            <a:r>
+              <a:rPr lang="en-US" sz="2000" dirty="0" err="1" smtClean="0"/>
+              <a:t>không</a:t>
+            </a:r>
+            <a:r>
+              <a:rPr lang="en-US" sz="2000" dirty="0" smtClean="0"/>
+              <a:t> </a:t>
+            </a:r>
+            <a:r>
+              <a:rPr lang="en-US" sz="2000" dirty="0" err="1" smtClean="0"/>
+              <a:t>lệch</a:t>
+            </a:r>
+            <a:r>
+              <a:rPr lang="en-US" sz="2000" dirty="0" smtClean="0"/>
+              <a:t> (unbiased estimator);</a:t>
+            </a:r>
+          </a:p>
+          <a:p>
+            <a:r>
+              <a:rPr lang="en-US" sz="2000" dirty="0" smtClean="0"/>
+              <a:t>b) </a:t>
+            </a:r>
+            <a:r>
+              <a:rPr lang="en-US" sz="2000" dirty="0" err="1" smtClean="0"/>
+              <a:t>Hãy</a:t>
+            </a:r>
+            <a:r>
+              <a:rPr lang="en-US" sz="2000" dirty="0" smtClean="0"/>
+              <a:t> </a:t>
+            </a:r>
+            <a:r>
+              <a:rPr lang="en-US" sz="2000" dirty="0" err="1" smtClean="0"/>
+              <a:t>giải</a:t>
+            </a:r>
+            <a:r>
+              <a:rPr lang="en-US" sz="2000" dirty="0" smtClean="0"/>
+              <a:t> </a:t>
+            </a:r>
+            <a:r>
+              <a:rPr lang="en-US" sz="2000" dirty="0" err="1" smtClean="0"/>
+              <a:t>thích</a:t>
+            </a:r>
+            <a:r>
+              <a:rPr lang="en-US" sz="2000" dirty="0" smtClean="0"/>
+              <a:t> </a:t>
+            </a:r>
+            <a:r>
+              <a:rPr lang="en-US" sz="2000" dirty="0" err="1" smtClean="0"/>
+              <a:t>vì</a:t>
+            </a:r>
+            <a:r>
+              <a:rPr lang="en-US" sz="2000" dirty="0" smtClean="0"/>
+              <a:t> </a:t>
+            </a:r>
+            <a:r>
+              <a:rPr lang="en-US" sz="2000" dirty="0" err="1" smtClean="0"/>
+              <a:t>sao</a:t>
+            </a:r>
+            <a:r>
+              <a:rPr lang="en-US" sz="2000" dirty="0" smtClean="0"/>
+              <a:t> </a:t>
+            </a:r>
+            <a:r>
+              <a:rPr lang="en-US" sz="2000" dirty="0" err="1"/>
+              <a:t>khó</a:t>
+            </a:r>
+            <a:r>
+              <a:rPr lang="en-US" sz="2000" dirty="0"/>
+              <a:t> </a:t>
+            </a:r>
+            <a:r>
+              <a:rPr lang="en-US" sz="2000" dirty="0" err="1"/>
+              <a:t>áp</a:t>
+            </a:r>
+            <a:r>
+              <a:rPr lang="en-US" sz="2000" dirty="0"/>
+              <a:t> </a:t>
+            </a:r>
+            <a:r>
+              <a:rPr lang="en-US" sz="2000" dirty="0" err="1" smtClean="0"/>
+              <a:t>dụng</a:t>
+            </a:r>
+            <a:r>
+              <a:rPr lang="en-US" sz="2000" dirty="0" smtClean="0"/>
+              <a:t> </a:t>
+            </a:r>
+            <a:r>
+              <a:rPr lang="en-US" sz="2000" dirty="0" err="1" smtClean="0"/>
+              <a:t>cách</a:t>
+            </a:r>
+            <a:r>
+              <a:rPr lang="en-US" sz="2000" dirty="0" smtClean="0"/>
+              <a:t> </a:t>
+            </a:r>
+            <a:r>
+              <a:rPr lang="en-US" sz="2000" dirty="0" err="1" smtClean="0"/>
+              <a:t>ước</a:t>
+            </a:r>
+            <a:r>
+              <a:rPr lang="en-US" sz="2000" dirty="0" smtClean="0"/>
+              <a:t> </a:t>
+            </a:r>
+            <a:r>
+              <a:rPr lang="en-US" sz="2000" dirty="0" err="1" smtClean="0"/>
+              <a:t>lượng</a:t>
+            </a:r>
+            <a:r>
+              <a:rPr lang="en-US" sz="2000" dirty="0" smtClean="0"/>
+              <a:t> </a:t>
+            </a:r>
+            <a:r>
+              <a:rPr lang="en-US" sz="2000" dirty="0" err="1" smtClean="0"/>
+              <a:t>này</a:t>
+            </a:r>
+            <a:r>
+              <a:rPr lang="en-US" sz="2000" dirty="0" smtClean="0"/>
+              <a:t> </a:t>
+            </a:r>
+            <a:r>
+              <a:rPr lang="en-US" sz="2000" dirty="0" err="1" smtClean="0"/>
+              <a:t>trong</a:t>
+            </a:r>
+            <a:r>
+              <a:rPr lang="en-US" sz="2000" dirty="0" smtClean="0"/>
+              <a:t> </a:t>
+            </a:r>
+            <a:r>
+              <a:rPr lang="en-US" sz="2000" dirty="0" err="1" smtClean="0"/>
+              <a:t>thực</a:t>
+            </a:r>
+            <a:r>
+              <a:rPr lang="en-US" sz="2000" dirty="0" smtClean="0"/>
+              <a:t> </a:t>
+            </a:r>
+            <a:r>
+              <a:rPr lang="en-US" sz="2000" dirty="0" err="1" smtClean="0"/>
+              <a:t>tế</a:t>
+            </a:r>
+            <a:r>
+              <a:rPr lang="en-US" sz="2000" dirty="0"/>
+              <a:t>?</a:t>
+            </a:r>
+            <a:endParaRPr lang="vi-VN" sz="2000" dirty="0"/>
+          </a:p>
+        </p:txBody>
+      </p:sp>
+    </p:spTree>
+    <p:extLst>
+      <p:ext uri="{BB962C8B-B14F-4D97-AF65-F5344CB8AC3E}">
+        <p14:creationId xmlns:p14="http://schemas.microsoft.com/office/powerpoint/2010/main" val="3144319223"/>
+      </p:ext>
+    </p:extLst>
+  </p:cSld>
+  <p:clrMapOvr>
+    <a:masterClrMapping/>
+  </p:clrMapOvr>
+  <p:timing>
+    <p:tnLst>
+      <p:par>
+        <p:cTn id="1" dur="indefinite" restart="never" nodeType="tmRoot"/>
+      </p:par>
+    </p:tnLst>
+  </p:timing>
 </p:sld>
 </file>
 
@@ -16063,7 +16590,7 @@
   </a:extraClrSchemeLst>
   <a:extLst>
     <a:ext uri="{05A4C25C-085E-4340-85A3-A5531E510DB2}">
-      <thm15:themeFamily xmlns:thm15="http://schemas.microsoft.com/office/thememl/2012/main" xmlns="" name="Office Theme" id="{62F939B6-93AF-4DB8-9C6B-D6C7DFDC589F}" vid="{4A3C46E8-61CC-4603-A589-7422A47A8E4A}"/>
+      <thm15:themeFamily xmlns="" xmlns:thm15="http://schemas.microsoft.com/office/thememl/2012/main" name="Office Theme" id="{62F939B6-93AF-4DB8-9C6B-D6C7DFDC589F}" vid="{4A3C46E8-61CC-4603-A589-7422A47A8E4A}"/>
     </a:ext>
   </a:extLst>
 </a:theme>
@@ -16112,7 +16639,7 @@
     </a:clrScheme>
     <a:fontScheme name="Office">
       <a:majorFont>
-        <a:latin typeface="Calibri Light" panose="020F0302020204030204"/>
+        <a:latin typeface="Calibri Light"/>
         <a:ea typeface=""/>
         <a:cs typeface=""/>
         <a:font script="Jpan" typeface="ＭＳ Ｐゴシック"/>
@@ -16147,7 +16674,7 @@
         <a:font script="Geor" typeface="Sylfaen"/>
       </a:majorFont>
       <a:minorFont>
-        <a:latin typeface="Calibri" panose="020F0502020204030204"/>
+        <a:latin typeface="Calibri"/>
         <a:ea typeface=""/>
         <a:cs typeface=""/>
         <a:font script="Jpan" typeface="ＭＳ Ｐゴシック"/>
@@ -16324,7 +16851,7 @@
   <a:extraClrSchemeLst/>
   <a:extLst>
     <a:ext uri="{05A4C25C-085E-4340-85A3-A5531E510DB2}">
-      <thm15:themeFamily xmlns:thm15="http://schemas.microsoft.com/office/thememl/2012/main" xmlns="" name="Office Theme" id="{62F939B6-93AF-4DB8-9C6B-D6C7DFDC589F}" vid="{4A3C46E8-61CC-4603-A589-7422A47A8E4A}"/>
+      <thm15:themeFamily xmlns="" xmlns:thm15="http://schemas.microsoft.com/office/thememl/2012/main" name="Office Theme" id="{62F939B6-93AF-4DB8-9C6B-D6C7DFDC589F}" vid="{4A3C46E8-61CC-4603-A589-7422A47A8E4A}"/>
     </a:ext>
   </a:extLst>
 </a:theme>

</xml_diff>